<commit_message>
Add more slides to 90-minute presentation. Update light theme template pptx.
</commit_message>
<xml_diff>
--- a/assets/powerpoint-styles/light-theme.pptx
+++ b/assets/powerpoint-styles/light-theme.pptx
@@ -104,12 +104,779 @@
       </a:defRPr>
     </a:lvl9pPr>
   </p:defaultTextStyle>
+  <p:extLst>
+    <p:ext uri="{EFAFB233-063F-42B5-8137-9DF3F51BA10A}">
+      <p15:sldGuideLst xmlns:p15="http://schemas.microsoft.com/office/powerpoint/2012/main"/>
+    </p:ext>
+  </p:extLst>
 </p:presentation>
 </file>
 
 <file path=ppt/slideLayouts/slideLayout1.xml><?xml version="1.0" encoding="utf-8"?>
-<p:sldLayout xmlns:a="http://schemas.openxmlformats.org/drawingml/2006/main" xmlns:r="http://schemas.openxmlformats.org/officeDocument/2006/relationships" xmlns:p="http://schemas.openxmlformats.org/presentationml/2006/main" showMasterSp="0" type="title" preserve="1">
-  <p:cSld name="Title Slide">
+<p:sldLayout xmlns:a="http://schemas.openxmlformats.org/drawingml/2006/main" xmlns:r="http://schemas.openxmlformats.org/officeDocument/2006/relationships" xmlns:p="http://schemas.openxmlformats.org/presentationml/2006/main" preserve="1" userDrawn="1">
+  <p:cSld name="Title and Content">
+    <p:spTree>
+      <p:nvGrpSpPr>
+        <p:cNvPr id="1" name=""/>
+        <p:cNvGrpSpPr/>
+        <p:nvPr/>
+      </p:nvGrpSpPr>
+      <p:grpSpPr>
+        <a:xfrm>
+          <a:off x="0" y="0"/>
+          <a:ext cx="0" cy="0"/>
+          <a:chOff x="0" y="0"/>
+          <a:chExt cx="0" cy="0"/>
+        </a:xfrm>
+      </p:grpSpPr>
+      <p:sp>
+        <p:nvSpPr>
+          <p:cNvPr id="2" name="Title 1"/>
+          <p:cNvSpPr>
+            <a:spLocks noGrp="1"/>
+          </p:cNvSpPr>
+          <p:nvPr>
+            <p:ph type="title"/>
+          </p:nvPr>
+        </p:nvSpPr>
+        <p:spPr/>
+        <p:txBody>
+          <a:bodyPr/>
+          <a:lstStyle>
+            <a:lvl1pPr marL="0">
+              <a:defRPr/>
+            </a:lvl1pPr>
+          </a:lstStyle>
+          <a:p>
+            <a:r>
+              <a:rPr lang="en-US"/>
+              <a:t>Click to edit Master title style</a:t>
+            </a:r>
+            <a:endParaRPr lang="en-US" dirty="0"/>
+          </a:p>
+        </p:txBody>
+      </p:sp>
+      <p:sp>
+        <p:nvSpPr>
+          <p:cNvPr id="3" name="Content Placeholder 2"/>
+          <p:cNvSpPr>
+            <a:spLocks noGrp="1"/>
+          </p:cNvSpPr>
+          <p:nvPr>
+            <p:ph idx="1"/>
+          </p:nvPr>
+        </p:nvSpPr>
+        <p:spPr/>
+        <p:txBody>
+          <a:bodyPr/>
+          <a:lstStyle/>
+          <a:p>
+            <a:pPr lvl="0"/>
+            <a:r>
+              <a:rPr lang="en-US"/>
+              <a:t>Click to edit Master text styles</a:t>
+            </a:r>
+          </a:p>
+          <a:p>
+            <a:pPr lvl="1"/>
+            <a:r>
+              <a:rPr lang="en-US"/>
+              <a:t>Second level</a:t>
+            </a:r>
+          </a:p>
+          <a:p>
+            <a:pPr lvl="2"/>
+            <a:r>
+              <a:rPr lang="en-US"/>
+              <a:t>Third level</a:t>
+            </a:r>
+          </a:p>
+          <a:p>
+            <a:pPr lvl="3"/>
+            <a:r>
+              <a:rPr lang="en-US"/>
+              <a:t>Fourth level</a:t>
+            </a:r>
+          </a:p>
+          <a:p>
+            <a:pPr lvl="4"/>
+            <a:r>
+              <a:rPr lang="en-US"/>
+              <a:t>Fifth level</a:t>
+            </a:r>
+            <a:endParaRPr lang="en-US" dirty="0"/>
+          </a:p>
+        </p:txBody>
+      </p:sp>
+      <p:sp>
+        <p:nvSpPr>
+          <p:cNvPr id="4" name="Date Placeholder 3"/>
+          <p:cNvSpPr>
+            <a:spLocks noGrp="1"/>
+          </p:cNvSpPr>
+          <p:nvPr>
+            <p:ph type="dt" sz="half" idx="10"/>
+          </p:nvPr>
+        </p:nvSpPr>
+        <p:spPr/>
+        <p:txBody>
+          <a:bodyPr/>
+          <a:lstStyle/>
+          <a:p>
+            <a:fld id="{2C5A4276-9034-4F68-8B2D-8D580C8476C4}" type="datetimeFigureOut">
+              <a:rPr lang="en-US" smtClean="0"/>
+              <a:t>10/16/2025</a:t>
+            </a:fld>
+            <a:endParaRPr lang="en-US"/>
+          </a:p>
+        </p:txBody>
+      </p:sp>
+      <p:sp>
+        <p:nvSpPr>
+          <p:cNvPr id="5" name="Footer Placeholder 4"/>
+          <p:cNvSpPr>
+            <a:spLocks noGrp="1"/>
+          </p:cNvSpPr>
+          <p:nvPr>
+            <p:ph type="ftr" sz="quarter" idx="11"/>
+          </p:nvPr>
+        </p:nvSpPr>
+        <p:spPr/>
+        <p:txBody>
+          <a:bodyPr/>
+          <a:lstStyle/>
+          <a:p>
+            <a:endParaRPr lang="en-US"/>
+          </a:p>
+        </p:txBody>
+      </p:sp>
+      <p:sp>
+        <p:nvSpPr>
+          <p:cNvPr id="6" name="Slide Number Placeholder 5"/>
+          <p:cNvSpPr>
+            <a:spLocks noGrp="1"/>
+          </p:cNvSpPr>
+          <p:nvPr>
+            <p:ph type="sldNum" sz="quarter" idx="12"/>
+          </p:nvPr>
+        </p:nvSpPr>
+        <p:spPr/>
+        <p:txBody>
+          <a:bodyPr/>
+          <a:lstStyle/>
+          <a:p>
+            <a:fld id="{51F9AB11-5268-4777-85B6-D98FC480BF1C}" type="slidenum">
+              <a:rPr lang="en-US" smtClean="0"/>
+              <a:t>‹#›</a:t>
+            </a:fld>
+            <a:endParaRPr lang="en-US"/>
+          </a:p>
+        </p:txBody>
+      </p:sp>
+      <p:sp>
+        <p:nvSpPr>
+          <p:cNvPr id="8" name="Content Placeholder 7">
+            <a:extLst>
+              <a:ext uri="{FF2B5EF4-FFF2-40B4-BE49-F238E27FC236}">
+                <a16:creationId xmlns:a16="http://schemas.microsoft.com/office/drawing/2014/main" id="{EA103B0F-8D17-54FA-FAEC-B3D1C167DD47}"/>
+              </a:ext>
+            </a:extLst>
+          </p:cNvPr>
+          <p:cNvSpPr>
+            <a:spLocks noGrp="1"/>
+          </p:cNvSpPr>
+          <p:nvPr>
+            <p:ph sz="quarter" idx="13"/>
+          </p:nvPr>
+        </p:nvSpPr>
+        <p:spPr/>
+        <p:txBody>
+          <a:bodyPr/>
+          <a:lstStyle/>
+          <a:p>
+            <a:pPr lvl="0"/>
+            <a:r>
+              <a:rPr lang="en-US"/>
+              <a:t>Click to edit Master text styles</a:t>
+            </a:r>
+          </a:p>
+          <a:p>
+            <a:pPr lvl="1"/>
+            <a:r>
+              <a:rPr lang="en-US"/>
+              <a:t>Second level</a:t>
+            </a:r>
+          </a:p>
+          <a:p>
+            <a:pPr lvl="2"/>
+            <a:r>
+              <a:rPr lang="en-US"/>
+              <a:t>Third level</a:t>
+            </a:r>
+          </a:p>
+          <a:p>
+            <a:pPr lvl="3"/>
+            <a:r>
+              <a:rPr lang="en-US"/>
+              <a:t>Fourth level</a:t>
+            </a:r>
+          </a:p>
+          <a:p>
+            <a:pPr lvl="4"/>
+            <a:r>
+              <a:rPr lang="en-US"/>
+              <a:t>Fifth level</a:t>
+            </a:r>
+          </a:p>
+        </p:txBody>
+      </p:sp>
+    </p:spTree>
+    <p:extLst>
+      <p:ext uri="{BB962C8B-B14F-4D97-AF65-F5344CB8AC3E}">
+        <p14:creationId xmlns:p14="http://schemas.microsoft.com/office/powerpoint/2010/main" val="4145143861"/>
+      </p:ext>
+    </p:extLst>
+  </p:cSld>
+  <p:clrMapOvr>
+    <a:masterClrMapping/>
+  </p:clrMapOvr>
+</p:sldLayout>
+</file>
+
+<file path=ppt/slideLayouts/slideLayout10.xml><?xml version="1.0" encoding="utf-8"?>
+<p:sldLayout xmlns:a="http://schemas.openxmlformats.org/drawingml/2006/main" xmlns:r="http://schemas.openxmlformats.org/officeDocument/2006/relationships" xmlns:p="http://schemas.openxmlformats.org/presentationml/2006/main" showMasterSp="0" type="picTx" preserve="1">
+  <p:cSld name="Picture with Caption">
+    <p:spTree>
+      <p:nvGrpSpPr>
+        <p:cNvPr id="1" name=""/>
+        <p:cNvGrpSpPr/>
+        <p:nvPr/>
+      </p:nvGrpSpPr>
+      <p:grpSpPr>
+        <a:xfrm>
+          <a:off x="0" y="0"/>
+          <a:ext cx="0" cy="0"/>
+          <a:chOff x="0" y="0"/>
+          <a:chExt cx="0" cy="0"/>
+        </a:xfrm>
+      </p:grpSpPr>
+      <p:sp>
+        <p:nvSpPr>
+          <p:cNvPr id="8" name="Rectangle 7"/>
+          <p:cNvSpPr/>
+          <p:nvPr/>
+        </p:nvSpPr>
+        <p:spPr>
+          <a:xfrm>
+            <a:off x="0" y="4953000"/>
+            <a:ext cx="12188825" cy="1905000"/>
+          </a:xfrm>
+          <a:prstGeom prst="rect">
+            <a:avLst/>
+          </a:prstGeom>
+          <a:solidFill>
+            <a:schemeClr val="accent2"/>
+          </a:solidFill>
+          <a:ln>
+            <a:noFill/>
+          </a:ln>
+        </p:spPr>
+        <p:style>
+          <a:lnRef idx="2">
+            <a:schemeClr val="accent1">
+              <a:shade val="50000"/>
+            </a:schemeClr>
+          </a:lnRef>
+          <a:fillRef idx="1">
+            <a:schemeClr val="accent1"/>
+          </a:fillRef>
+          <a:effectRef idx="0">
+            <a:schemeClr val="accent1"/>
+          </a:effectRef>
+          <a:fontRef idx="minor">
+            <a:schemeClr val="lt1"/>
+          </a:fontRef>
+        </p:style>
+      </p:sp>
+      <p:sp>
+        <p:nvSpPr>
+          <p:cNvPr id="9" name="Rectangle 8"/>
+          <p:cNvSpPr/>
+          <p:nvPr/>
+        </p:nvSpPr>
+        <p:spPr>
+          <a:xfrm>
+            <a:off x="15" y="4915076"/>
+            <a:ext cx="12188825" cy="64008"/>
+          </a:xfrm>
+          <a:prstGeom prst="rect">
+            <a:avLst/>
+          </a:prstGeom>
+          <a:solidFill>
+            <a:schemeClr val="accent1"/>
+          </a:solidFill>
+          <a:ln>
+            <a:noFill/>
+          </a:ln>
+        </p:spPr>
+        <p:style>
+          <a:lnRef idx="2">
+            <a:schemeClr val="accent1">
+              <a:shade val="50000"/>
+            </a:schemeClr>
+          </a:lnRef>
+          <a:fillRef idx="1">
+            <a:schemeClr val="accent1"/>
+          </a:fillRef>
+          <a:effectRef idx="0">
+            <a:schemeClr val="accent1"/>
+          </a:effectRef>
+          <a:fontRef idx="minor">
+            <a:schemeClr val="lt1"/>
+          </a:fontRef>
+        </p:style>
+      </p:sp>
+      <p:sp>
+        <p:nvSpPr>
+          <p:cNvPr id="2" name="Title 1"/>
+          <p:cNvSpPr>
+            <a:spLocks noGrp="1"/>
+          </p:cNvSpPr>
+          <p:nvPr>
+            <p:ph type="title"/>
+          </p:nvPr>
+        </p:nvSpPr>
+        <p:spPr>
+          <a:xfrm>
+            <a:off x="1097280" y="5074920"/>
+            <a:ext cx="10113264" cy="822960"/>
+          </a:xfrm>
+        </p:spPr>
+        <p:txBody>
+          <a:bodyPr lIns="91440" tIns="0" rIns="91440" bIns="0" anchor="b">
+            <a:noAutofit/>
+          </a:bodyPr>
+          <a:lstStyle>
+            <a:lvl1pPr>
+              <a:defRPr sz="3600" b="0">
+                <a:solidFill>
+                  <a:srgbClr val="FFFFFF"/>
+                </a:solidFill>
+              </a:defRPr>
+            </a:lvl1pPr>
+          </a:lstStyle>
+          <a:p>
+            <a:r>
+              <a:rPr lang="en-US"/>
+              <a:t>Click to edit Master title style</a:t>
+            </a:r>
+            <a:endParaRPr lang="en-US" dirty="0"/>
+          </a:p>
+        </p:txBody>
+      </p:sp>
+      <p:sp>
+        <p:nvSpPr>
+          <p:cNvPr id="3" name="Picture Placeholder 2"/>
+          <p:cNvSpPr>
+            <a:spLocks noGrp="1" noChangeAspect="1"/>
+          </p:cNvSpPr>
+          <p:nvPr>
+            <p:ph type="pic" idx="1"/>
+          </p:nvPr>
+        </p:nvSpPr>
+        <p:spPr>
+          <a:xfrm>
+            <a:off x="15" y="0"/>
+            <a:ext cx="12191985" cy="4915076"/>
+          </a:xfrm>
+          <a:blipFill>
+            <a:blip r:embed="rId2"/>
+            <a:stretch>
+              <a:fillRect/>
+            </a:stretch>
+          </a:blipFill>
+        </p:spPr>
+        <p:txBody>
+          <a:bodyPr lIns="457200" tIns="457200" anchor="t"/>
+          <a:lstStyle>
+            <a:lvl1pPr marL="0" indent="0">
+              <a:buNone/>
+              <a:defRPr sz="3200">
+                <a:solidFill>
+                  <a:schemeClr val="bg1"/>
+                </a:solidFill>
+              </a:defRPr>
+            </a:lvl1pPr>
+            <a:lvl2pPr marL="457200" indent="0">
+              <a:buNone/>
+              <a:defRPr sz="2800"/>
+            </a:lvl2pPr>
+            <a:lvl3pPr marL="914400" indent="0">
+              <a:buNone/>
+              <a:defRPr sz="2400"/>
+            </a:lvl3pPr>
+            <a:lvl4pPr marL="1371600" indent="0">
+              <a:buNone/>
+              <a:defRPr sz="2000"/>
+            </a:lvl4pPr>
+            <a:lvl5pPr marL="1828800" indent="0">
+              <a:buNone/>
+              <a:defRPr sz="2000"/>
+            </a:lvl5pPr>
+            <a:lvl6pPr marL="2286000" indent="0">
+              <a:buNone/>
+              <a:defRPr sz="2000"/>
+            </a:lvl6pPr>
+            <a:lvl7pPr marL="2743200" indent="0">
+              <a:buNone/>
+              <a:defRPr sz="2000"/>
+            </a:lvl7pPr>
+            <a:lvl8pPr marL="3200400" indent="0">
+              <a:buNone/>
+              <a:defRPr sz="2000"/>
+            </a:lvl8pPr>
+            <a:lvl9pPr marL="3657600" indent="0">
+              <a:buNone/>
+              <a:defRPr sz="2000"/>
+            </a:lvl9pPr>
+          </a:lstStyle>
+          <a:p>
+            <a:r>
+              <a:rPr lang="en-US"/>
+              <a:t>Click icon to add picture</a:t>
+            </a:r>
+            <a:endParaRPr lang="en-US" dirty="0"/>
+          </a:p>
+        </p:txBody>
+      </p:sp>
+      <p:sp>
+        <p:nvSpPr>
+          <p:cNvPr id="4" name="Text Placeholder 3"/>
+          <p:cNvSpPr>
+            <a:spLocks noGrp="1"/>
+          </p:cNvSpPr>
+          <p:nvPr>
+            <p:ph type="body" sz="half" idx="2"/>
+          </p:nvPr>
+        </p:nvSpPr>
+        <p:spPr>
+          <a:xfrm>
+            <a:off x="1097280" y="5907023"/>
+            <a:ext cx="10113264" cy="594360"/>
+          </a:xfrm>
+        </p:spPr>
+        <p:txBody>
+          <a:bodyPr lIns="91440" tIns="0" rIns="91440" bIns="0">
+            <a:normAutofit/>
+          </a:bodyPr>
+          <a:lstStyle>
+            <a:lvl1pPr marL="0" indent="0">
+              <a:spcBef>
+                <a:spcPts val="0"/>
+              </a:spcBef>
+              <a:spcAft>
+                <a:spcPts val="600"/>
+              </a:spcAft>
+              <a:buNone/>
+              <a:defRPr sz="1500">
+                <a:solidFill>
+                  <a:srgbClr val="FFFFFF"/>
+                </a:solidFill>
+              </a:defRPr>
+            </a:lvl1pPr>
+            <a:lvl2pPr marL="457200" indent="0">
+              <a:buNone/>
+              <a:defRPr sz="1200"/>
+            </a:lvl2pPr>
+            <a:lvl3pPr marL="914400" indent="0">
+              <a:buNone/>
+              <a:defRPr sz="1000"/>
+            </a:lvl3pPr>
+            <a:lvl4pPr marL="1371600" indent="0">
+              <a:buNone/>
+              <a:defRPr sz="900"/>
+            </a:lvl4pPr>
+            <a:lvl5pPr marL="1828800" indent="0">
+              <a:buNone/>
+              <a:defRPr sz="900"/>
+            </a:lvl5pPr>
+            <a:lvl6pPr marL="2286000" indent="0">
+              <a:buNone/>
+              <a:defRPr sz="900"/>
+            </a:lvl6pPr>
+            <a:lvl7pPr marL="2743200" indent="0">
+              <a:buNone/>
+              <a:defRPr sz="900"/>
+            </a:lvl7pPr>
+            <a:lvl8pPr marL="3200400" indent="0">
+              <a:buNone/>
+              <a:defRPr sz="900"/>
+            </a:lvl8pPr>
+            <a:lvl9pPr marL="3657600" indent="0">
+              <a:buNone/>
+              <a:defRPr sz="900"/>
+            </a:lvl9pPr>
+          </a:lstStyle>
+          <a:p>
+            <a:pPr lvl="0"/>
+            <a:r>
+              <a:rPr lang="en-US"/>
+              <a:t>Click to edit Master text styles</a:t>
+            </a:r>
+          </a:p>
+        </p:txBody>
+      </p:sp>
+      <p:sp>
+        <p:nvSpPr>
+          <p:cNvPr id="5" name="Date Placeholder 4"/>
+          <p:cNvSpPr>
+            <a:spLocks noGrp="1"/>
+          </p:cNvSpPr>
+          <p:nvPr>
+            <p:ph type="dt" sz="half" idx="10"/>
+          </p:nvPr>
+        </p:nvSpPr>
+        <p:spPr/>
+        <p:txBody>
+          <a:bodyPr/>
+          <a:lstStyle/>
+          <a:p>
+            <a:fld id="{2C5A4276-9034-4F68-8B2D-8D580C8476C4}" type="datetimeFigureOut">
+              <a:rPr lang="en-US" smtClean="0"/>
+              <a:t>10/16/2025</a:t>
+            </a:fld>
+            <a:endParaRPr lang="en-US"/>
+          </a:p>
+        </p:txBody>
+      </p:sp>
+      <p:sp>
+        <p:nvSpPr>
+          <p:cNvPr id="6" name="Footer Placeholder 5"/>
+          <p:cNvSpPr>
+            <a:spLocks noGrp="1"/>
+          </p:cNvSpPr>
+          <p:nvPr>
+            <p:ph type="ftr" sz="quarter" idx="11"/>
+          </p:nvPr>
+        </p:nvSpPr>
+        <p:spPr/>
+        <p:txBody>
+          <a:bodyPr/>
+          <a:lstStyle/>
+          <a:p>
+            <a:endParaRPr lang="en-US"/>
+          </a:p>
+        </p:txBody>
+      </p:sp>
+      <p:sp>
+        <p:nvSpPr>
+          <p:cNvPr id="7" name="Slide Number Placeholder 6"/>
+          <p:cNvSpPr>
+            <a:spLocks noGrp="1"/>
+          </p:cNvSpPr>
+          <p:nvPr>
+            <p:ph type="sldNum" sz="quarter" idx="12"/>
+          </p:nvPr>
+        </p:nvSpPr>
+        <p:spPr/>
+        <p:txBody>
+          <a:bodyPr/>
+          <a:lstStyle/>
+          <a:p>
+            <a:fld id="{51F9AB11-5268-4777-85B6-D98FC480BF1C}" type="slidenum">
+              <a:rPr lang="en-US" smtClean="0"/>
+              <a:t>‹#›</a:t>
+            </a:fld>
+            <a:endParaRPr lang="en-US"/>
+          </a:p>
+        </p:txBody>
+      </p:sp>
+    </p:spTree>
+    <p:extLst>
+      <p:ext uri="{BB962C8B-B14F-4D97-AF65-F5344CB8AC3E}">
+        <p14:creationId xmlns:p14="http://schemas.microsoft.com/office/powerpoint/2010/main" val="1651376254"/>
+      </p:ext>
+    </p:extLst>
+  </p:cSld>
+  <p:clrMapOvr>
+    <a:masterClrMapping/>
+  </p:clrMapOvr>
+</p:sldLayout>
+</file>
+
+<file path=ppt/slideLayouts/slideLayout11.xml><?xml version="1.0" encoding="utf-8"?>
+<p:sldLayout xmlns:a="http://schemas.openxmlformats.org/drawingml/2006/main" xmlns:r="http://schemas.openxmlformats.org/officeDocument/2006/relationships" xmlns:p="http://schemas.openxmlformats.org/presentationml/2006/main" type="vertTx" preserve="1">
+  <p:cSld name="Title and Vertical Text">
+    <p:spTree>
+      <p:nvGrpSpPr>
+        <p:cNvPr id="1" name=""/>
+        <p:cNvGrpSpPr/>
+        <p:nvPr/>
+      </p:nvGrpSpPr>
+      <p:grpSpPr>
+        <a:xfrm>
+          <a:off x="0" y="0"/>
+          <a:ext cx="0" cy="0"/>
+          <a:chOff x="0" y="0"/>
+          <a:chExt cx="0" cy="0"/>
+        </a:xfrm>
+      </p:grpSpPr>
+      <p:sp>
+        <p:nvSpPr>
+          <p:cNvPr id="2" name="Title 1"/>
+          <p:cNvSpPr>
+            <a:spLocks noGrp="1"/>
+          </p:cNvSpPr>
+          <p:nvPr>
+            <p:ph type="title"/>
+          </p:nvPr>
+        </p:nvSpPr>
+        <p:spPr/>
+        <p:txBody>
+          <a:bodyPr/>
+          <a:lstStyle/>
+          <a:p>
+            <a:r>
+              <a:rPr lang="en-US"/>
+              <a:t>Click to edit Master title style</a:t>
+            </a:r>
+            <a:endParaRPr lang="en-US" dirty="0"/>
+          </a:p>
+        </p:txBody>
+      </p:sp>
+      <p:sp>
+        <p:nvSpPr>
+          <p:cNvPr id="3" name="Vertical Text Placeholder 2"/>
+          <p:cNvSpPr>
+            <a:spLocks noGrp="1"/>
+          </p:cNvSpPr>
+          <p:nvPr>
+            <p:ph type="body" orient="vert" idx="1"/>
+          </p:nvPr>
+        </p:nvSpPr>
+        <p:spPr/>
+        <p:txBody>
+          <a:bodyPr vert="eaVert" lIns="45720" tIns="0" rIns="45720" bIns="0"/>
+          <a:lstStyle/>
+          <a:p>
+            <a:pPr lvl="0"/>
+            <a:r>
+              <a:rPr lang="en-US"/>
+              <a:t>Click to edit Master text styles</a:t>
+            </a:r>
+          </a:p>
+          <a:p>
+            <a:pPr lvl="1"/>
+            <a:r>
+              <a:rPr lang="en-US"/>
+              <a:t>Second level</a:t>
+            </a:r>
+          </a:p>
+          <a:p>
+            <a:pPr lvl="2"/>
+            <a:r>
+              <a:rPr lang="en-US"/>
+              <a:t>Third level</a:t>
+            </a:r>
+          </a:p>
+          <a:p>
+            <a:pPr lvl="3"/>
+            <a:r>
+              <a:rPr lang="en-US"/>
+              <a:t>Fourth level</a:t>
+            </a:r>
+          </a:p>
+          <a:p>
+            <a:pPr lvl="4"/>
+            <a:r>
+              <a:rPr lang="en-US"/>
+              <a:t>Fifth level</a:t>
+            </a:r>
+            <a:endParaRPr lang="en-US" dirty="0"/>
+          </a:p>
+        </p:txBody>
+      </p:sp>
+      <p:sp>
+        <p:nvSpPr>
+          <p:cNvPr id="4" name="Date Placeholder 3"/>
+          <p:cNvSpPr>
+            <a:spLocks noGrp="1"/>
+          </p:cNvSpPr>
+          <p:nvPr>
+            <p:ph type="dt" sz="half" idx="10"/>
+          </p:nvPr>
+        </p:nvSpPr>
+        <p:spPr/>
+        <p:txBody>
+          <a:bodyPr/>
+          <a:lstStyle/>
+          <a:p>
+            <a:fld id="{2C5A4276-9034-4F68-8B2D-8D580C8476C4}" type="datetimeFigureOut">
+              <a:rPr lang="en-US" smtClean="0"/>
+              <a:t>10/16/2025</a:t>
+            </a:fld>
+            <a:endParaRPr lang="en-US"/>
+          </a:p>
+        </p:txBody>
+      </p:sp>
+      <p:sp>
+        <p:nvSpPr>
+          <p:cNvPr id="5" name="Footer Placeholder 4"/>
+          <p:cNvSpPr>
+            <a:spLocks noGrp="1"/>
+          </p:cNvSpPr>
+          <p:nvPr>
+            <p:ph type="ftr" sz="quarter" idx="11"/>
+          </p:nvPr>
+        </p:nvSpPr>
+        <p:spPr/>
+        <p:txBody>
+          <a:bodyPr/>
+          <a:lstStyle/>
+          <a:p>
+            <a:endParaRPr lang="en-US"/>
+          </a:p>
+        </p:txBody>
+      </p:sp>
+      <p:sp>
+        <p:nvSpPr>
+          <p:cNvPr id="6" name="Slide Number Placeholder 5"/>
+          <p:cNvSpPr>
+            <a:spLocks noGrp="1"/>
+          </p:cNvSpPr>
+          <p:nvPr>
+            <p:ph type="sldNum" sz="quarter" idx="12"/>
+          </p:nvPr>
+        </p:nvSpPr>
+        <p:spPr/>
+        <p:txBody>
+          <a:bodyPr/>
+          <a:lstStyle/>
+          <a:p>
+            <a:fld id="{51F9AB11-5268-4777-85B6-D98FC480BF1C}" type="slidenum">
+              <a:rPr lang="en-US" smtClean="0"/>
+              <a:t>‹#›</a:t>
+            </a:fld>
+            <a:endParaRPr lang="en-US"/>
+          </a:p>
+        </p:txBody>
+      </p:sp>
+    </p:spTree>
+    <p:extLst>
+      <p:ext uri="{BB962C8B-B14F-4D97-AF65-F5344CB8AC3E}">
+        <p14:creationId xmlns:p14="http://schemas.microsoft.com/office/powerpoint/2010/main" val="2955095806"/>
+      </p:ext>
+    </p:extLst>
+  </p:cSld>
+  <p:clrMapOvr>
+    <a:masterClrMapping/>
+  </p:clrMapOvr>
+</p:sldLayout>
+</file>
+
+<file path=ppt/slideLayouts/slideLayout12.xml><?xml version="1.0" encoding="utf-8"?>
+<p:sldLayout xmlns:a="http://schemas.openxmlformats.org/drawingml/2006/main" xmlns:r="http://schemas.openxmlformats.org/officeDocument/2006/relationships" xmlns:p="http://schemas.openxmlformats.org/presentationml/2006/main" showMasterSp="0" type="vertTitleAndTx" preserve="1">
+  <p:cSld name="Vertical Title and Text">
     <p:spTree>
       <p:nvGrpSpPr>
         <p:cNvPr id="1" name=""/>
@@ -202,6 +969,577 @@
       </p:sp>
       <p:sp>
         <p:nvSpPr>
+          <p:cNvPr id="2" name="Vertical Title 1"/>
+          <p:cNvSpPr>
+            <a:spLocks noGrp="1"/>
+          </p:cNvSpPr>
+          <p:nvPr>
+            <p:ph type="title" orient="vert"/>
+          </p:nvPr>
+        </p:nvSpPr>
+        <p:spPr>
+          <a:xfrm>
+            <a:off x="8724900" y="414778"/>
+            <a:ext cx="2628900" cy="5757421"/>
+          </a:xfrm>
+        </p:spPr>
+        <p:txBody>
+          <a:bodyPr vert="eaVert"/>
+          <a:lstStyle/>
+          <a:p>
+            <a:r>
+              <a:rPr lang="en-US"/>
+              <a:t>Click to edit Master title style</a:t>
+            </a:r>
+            <a:endParaRPr lang="en-US" dirty="0"/>
+          </a:p>
+        </p:txBody>
+      </p:sp>
+      <p:sp>
+        <p:nvSpPr>
+          <p:cNvPr id="3" name="Vertical Text Placeholder 2"/>
+          <p:cNvSpPr>
+            <a:spLocks noGrp="1"/>
+          </p:cNvSpPr>
+          <p:nvPr>
+            <p:ph type="body" orient="vert" idx="1"/>
+          </p:nvPr>
+        </p:nvSpPr>
+        <p:spPr>
+          <a:xfrm>
+            <a:off x="838200" y="414778"/>
+            <a:ext cx="7734300" cy="5757422"/>
+          </a:xfrm>
+        </p:spPr>
+        <p:txBody>
+          <a:bodyPr vert="eaVert" lIns="45720" tIns="0" rIns="45720" bIns="0"/>
+          <a:lstStyle/>
+          <a:p>
+            <a:pPr lvl="0"/>
+            <a:r>
+              <a:rPr lang="en-US"/>
+              <a:t>Click to edit Master text styles</a:t>
+            </a:r>
+          </a:p>
+          <a:p>
+            <a:pPr lvl="1"/>
+            <a:r>
+              <a:rPr lang="en-US"/>
+              <a:t>Second level</a:t>
+            </a:r>
+          </a:p>
+          <a:p>
+            <a:pPr lvl="2"/>
+            <a:r>
+              <a:rPr lang="en-US"/>
+              <a:t>Third level</a:t>
+            </a:r>
+          </a:p>
+          <a:p>
+            <a:pPr lvl="3"/>
+            <a:r>
+              <a:rPr lang="en-US"/>
+              <a:t>Fourth level</a:t>
+            </a:r>
+          </a:p>
+          <a:p>
+            <a:pPr lvl="4"/>
+            <a:r>
+              <a:rPr lang="en-US"/>
+              <a:t>Fifth level</a:t>
+            </a:r>
+            <a:endParaRPr lang="en-US" dirty="0"/>
+          </a:p>
+        </p:txBody>
+      </p:sp>
+      <p:sp>
+        <p:nvSpPr>
+          <p:cNvPr id="4" name="Date Placeholder 3"/>
+          <p:cNvSpPr>
+            <a:spLocks noGrp="1"/>
+          </p:cNvSpPr>
+          <p:nvPr>
+            <p:ph type="dt" sz="half" idx="10"/>
+          </p:nvPr>
+        </p:nvSpPr>
+        <p:spPr/>
+        <p:txBody>
+          <a:bodyPr/>
+          <a:lstStyle/>
+          <a:p>
+            <a:fld id="{2C5A4276-9034-4F68-8B2D-8D580C8476C4}" type="datetimeFigureOut">
+              <a:rPr lang="en-US" smtClean="0"/>
+              <a:t>10/16/2025</a:t>
+            </a:fld>
+            <a:endParaRPr lang="en-US"/>
+          </a:p>
+        </p:txBody>
+      </p:sp>
+      <p:sp>
+        <p:nvSpPr>
+          <p:cNvPr id="5" name="Footer Placeholder 4"/>
+          <p:cNvSpPr>
+            <a:spLocks noGrp="1"/>
+          </p:cNvSpPr>
+          <p:nvPr>
+            <p:ph type="ftr" sz="quarter" idx="11"/>
+          </p:nvPr>
+        </p:nvSpPr>
+        <p:spPr/>
+        <p:txBody>
+          <a:bodyPr/>
+          <a:lstStyle/>
+          <a:p>
+            <a:endParaRPr lang="en-US"/>
+          </a:p>
+        </p:txBody>
+      </p:sp>
+      <p:sp>
+        <p:nvSpPr>
+          <p:cNvPr id="6" name="Slide Number Placeholder 5"/>
+          <p:cNvSpPr>
+            <a:spLocks noGrp="1"/>
+          </p:cNvSpPr>
+          <p:nvPr>
+            <p:ph type="sldNum" sz="quarter" idx="12"/>
+          </p:nvPr>
+        </p:nvSpPr>
+        <p:spPr/>
+        <p:txBody>
+          <a:bodyPr/>
+          <a:lstStyle/>
+          <a:p>
+            <a:fld id="{51F9AB11-5268-4777-85B6-D98FC480BF1C}" type="slidenum">
+              <a:rPr lang="en-US" smtClean="0"/>
+              <a:t>‹#›</a:t>
+            </a:fld>
+            <a:endParaRPr lang="en-US"/>
+          </a:p>
+        </p:txBody>
+      </p:sp>
+    </p:spTree>
+    <p:extLst>
+      <p:ext uri="{BB962C8B-B14F-4D97-AF65-F5344CB8AC3E}">
+        <p14:creationId xmlns:p14="http://schemas.microsoft.com/office/powerpoint/2010/main" val="3657699035"/>
+      </p:ext>
+    </p:extLst>
+  </p:cSld>
+  <p:clrMapOvr>
+    <a:masterClrMapping/>
+  </p:clrMapOvr>
+</p:sldLayout>
+</file>
+
+<file path=ppt/slideLayouts/slideLayout2.xml><?xml version="1.0" encoding="utf-8"?>
+<p:sldLayout xmlns:a="http://schemas.openxmlformats.org/drawingml/2006/main" xmlns:r="http://schemas.openxmlformats.org/officeDocument/2006/relationships" xmlns:p="http://schemas.openxmlformats.org/presentationml/2006/main" preserve="1" userDrawn="1">
+  <p:cSld name="CodeDark">
+    <p:bg>
+      <p:bgRef idx="1001">
+        <a:schemeClr val="bg1"/>
+      </p:bgRef>
+    </p:bg>
+    <p:spTree>
+      <p:nvGrpSpPr>
+        <p:cNvPr id="1" name=""/>
+        <p:cNvGrpSpPr/>
+        <p:nvPr/>
+      </p:nvGrpSpPr>
+      <p:grpSpPr>
+        <a:xfrm>
+          <a:off x="0" y="0"/>
+          <a:ext cx="0" cy="0"/>
+          <a:chOff x="0" y="0"/>
+          <a:chExt cx="0" cy="0"/>
+        </a:xfrm>
+      </p:grpSpPr>
+      <p:sp>
+        <p:nvSpPr>
+          <p:cNvPr id="2" name="Title 1"/>
+          <p:cNvSpPr>
+            <a:spLocks noGrp="1"/>
+          </p:cNvSpPr>
+          <p:nvPr>
+            <p:ph type="title"/>
+          </p:nvPr>
+        </p:nvSpPr>
+        <p:spPr/>
+        <p:txBody>
+          <a:bodyPr/>
+          <a:lstStyle>
+            <a:lvl1pPr marL="0">
+              <a:defRPr/>
+            </a:lvl1pPr>
+          </a:lstStyle>
+          <a:p>
+            <a:r>
+              <a:rPr lang="en-US"/>
+              <a:t>Click to edit Master title style</a:t>
+            </a:r>
+            <a:endParaRPr lang="en-US" dirty="0"/>
+          </a:p>
+        </p:txBody>
+      </p:sp>
+      <p:sp>
+        <p:nvSpPr>
+          <p:cNvPr id="3" name="Content Placeholder 2"/>
+          <p:cNvSpPr>
+            <a:spLocks noGrp="1"/>
+          </p:cNvSpPr>
+          <p:nvPr>
+            <p:ph idx="1"/>
+          </p:nvPr>
+        </p:nvSpPr>
+        <p:spPr/>
+        <p:txBody>
+          <a:bodyPr/>
+          <a:lstStyle/>
+          <a:p>
+            <a:pPr lvl="0"/>
+            <a:r>
+              <a:rPr lang="en-US"/>
+              <a:t>Click to edit Master text styles</a:t>
+            </a:r>
+          </a:p>
+          <a:p>
+            <a:pPr lvl="1"/>
+            <a:r>
+              <a:rPr lang="en-US"/>
+              <a:t>Second level</a:t>
+            </a:r>
+          </a:p>
+          <a:p>
+            <a:pPr lvl="2"/>
+            <a:r>
+              <a:rPr lang="en-US"/>
+              <a:t>Third level</a:t>
+            </a:r>
+          </a:p>
+          <a:p>
+            <a:pPr lvl="3"/>
+            <a:r>
+              <a:rPr lang="en-US"/>
+              <a:t>Fourth level</a:t>
+            </a:r>
+          </a:p>
+          <a:p>
+            <a:pPr lvl="4"/>
+            <a:r>
+              <a:rPr lang="en-US"/>
+              <a:t>Fifth level</a:t>
+            </a:r>
+            <a:endParaRPr lang="en-US" dirty="0"/>
+          </a:p>
+        </p:txBody>
+      </p:sp>
+      <p:sp>
+        <p:nvSpPr>
+          <p:cNvPr id="4" name="Date Placeholder 3"/>
+          <p:cNvSpPr>
+            <a:spLocks noGrp="1"/>
+          </p:cNvSpPr>
+          <p:nvPr>
+            <p:ph type="dt" sz="half" idx="10"/>
+          </p:nvPr>
+        </p:nvSpPr>
+        <p:spPr/>
+        <p:txBody>
+          <a:bodyPr/>
+          <a:lstStyle/>
+          <a:p>
+            <a:fld id="{2C5A4276-9034-4F68-8B2D-8D580C8476C4}" type="datetimeFigureOut">
+              <a:rPr lang="en-US" smtClean="0"/>
+              <a:t>10/16/2025</a:t>
+            </a:fld>
+            <a:endParaRPr lang="en-US"/>
+          </a:p>
+        </p:txBody>
+      </p:sp>
+      <p:sp>
+        <p:nvSpPr>
+          <p:cNvPr id="5" name="Footer Placeholder 4"/>
+          <p:cNvSpPr>
+            <a:spLocks noGrp="1"/>
+          </p:cNvSpPr>
+          <p:nvPr>
+            <p:ph type="ftr" sz="quarter" idx="11"/>
+          </p:nvPr>
+        </p:nvSpPr>
+        <p:spPr/>
+        <p:txBody>
+          <a:bodyPr/>
+          <a:lstStyle/>
+          <a:p>
+            <a:endParaRPr lang="en-US"/>
+          </a:p>
+        </p:txBody>
+      </p:sp>
+      <p:sp>
+        <p:nvSpPr>
+          <p:cNvPr id="6" name="Slide Number Placeholder 5"/>
+          <p:cNvSpPr>
+            <a:spLocks noGrp="1"/>
+          </p:cNvSpPr>
+          <p:nvPr>
+            <p:ph type="sldNum" sz="quarter" idx="12"/>
+          </p:nvPr>
+        </p:nvSpPr>
+        <p:spPr/>
+        <p:txBody>
+          <a:bodyPr/>
+          <a:lstStyle/>
+          <a:p>
+            <a:fld id="{51F9AB11-5268-4777-85B6-D98FC480BF1C}" type="slidenum">
+              <a:rPr lang="en-US" smtClean="0"/>
+              <a:t>‹#›</a:t>
+            </a:fld>
+            <a:endParaRPr lang="en-US"/>
+          </a:p>
+        </p:txBody>
+      </p:sp>
+      <p:sp>
+        <p:nvSpPr>
+          <p:cNvPr id="8" name="Content Placeholder 7">
+            <a:extLst>
+              <a:ext uri="{FF2B5EF4-FFF2-40B4-BE49-F238E27FC236}">
+                <a16:creationId xmlns:a16="http://schemas.microsoft.com/office/drawing/2014/main" id="{EA103B0F-8D17-54FA-FAEC-B3D1C167DD47}"/>
+              </a:ext>
+            </a:extLst>
+          </p:cNvPr>
+          <p:cNvSpPr>
+            <a:spLocks noGrp="1"/>
+          </p:cNvSpPr>
+          <p:nvPr>
+            <p:ph sz="quarter" idx="13"/>
+          </p:nvPr>
+        </p:nvSpPr>
+        <p:spPr/>
+        <p:txBody>
+          <a:bodyPr/>
+          <a:lstStyle/>
+          <a:p>
+            <a:pPr lvl="0"/>
+            <a:r>
+              <a:rPr lang="en-US" dirty="0"/>
+              <a:t>Click to edit Master text styles</a:t>
+            </a:r>
+          </a:p>
+          <a:p>
+            <a:pPr lvl="1"/>
+            <a:r>
+              <a:rPr lang="en-US" dirty="0"/>
+              <a:t>Second level</a:t>
+            </a:r>
+          </a:p>
+          <a:p>
+            <a:pPr lvl="2"/>
+            <a:r>
+              <a:rPr lang="en-US" dirty="0"/>
+              <a:t>Third level</a:t>
+            </a:r>
+          </a:p>
+          <a:p>
+            <a:pPr lvl="3"/>
+            <a:r>
+              <a:rPr lang="en-US" dirty="0"/>
+              <a:t>Fourth level</a:t>
+            </a:r>
+          </a:p>
+          <a:p>
+            <a:pPr lvl="4"/>
+            <a:r>
+              <a:rPr lang="en-US" dirty="0"/>
+              <a:t>Fifth level</a:t>
+            </a:r>
+          </a:p>
+        </p:txBody>
+      </p:sp>
+      <p:sp>
+        <p:nvSpPr>
+          <p:cNvPr id="9" name="Content Placeholder 8">
+            <a:extLst>
+              <a:ext uri="{FF2B5EF4-FFF2-40B4-BE49-F238E27FC236}">
+                <a16:creationId xmlns:a16="http://schemas.microsoft.com/office/drawing/2014/main" id="{184FCCE5-6201-0E94-39E2-228F2623B732}"/>
+              </a:ext>
+            </a:extLst>
+          </p:cNvPr>
+          <p:cNvSpPr>
+            <a:spLocks noGrp="1"/>
+          </p:cNvSpPr>
+          <p:nvPr>
+            <p:ph sz="quarter" idx="14"/>
+          </p:nvPr>
+        </p:nvSpPr>
+        <p:spPr>
+          <a:xfrm>
+            <a:off x="1096963" y="1846263"/>
+            <a:ext cx="10115550" cy="4022725"/>
+          </a:xfrm>
+          <a:solidFill>
+            <a:schemeClr val="bg1"/>
+          </a:solidFill>
+        </p:spPr>
+        <p:txBody>
+          <a:bodyPr/>
+          <a:lstStyle/>
+          <a:p>
+            <a:pPr lvl="0"/>
+            <a:r>
+              <a:rPr lang="en-US"/>
+              <a:t>Click to edit Master text styles</a:t>
+            </a:r>
+          </a:p>
+          <a:p>
+            <a:pPr lvl="1"/>
+            <a:r>
+              <a:rPr lang="en-US"/>
+              <a:t>Second level</a:t>
+            </a:r>
+          </a:p>
+          <a:p>
+            <a:pPr lvl="2"/>
+            <a:r>
+              <a:rPr lang="en-US"/>
+              <a:t>Third level</a:t>
+            </a:r>
+          </a:p>
+          <a:p>
+            <a:pPr lvl="3"/>
+            <a:r>
+              <a:rPr lang="en-US"/>
+              <a:t>Fourth level</a:t>
+            </a:r>
+          </a:p>
+          <a:p>
+            <a:pPr lvl="4"/>
+            <a:r>
+              <a:rPr lang="en-US"/>
+              <a:t>Fifth level</a:t>
+            </a:r>
+          </a:p>
+        </p:txBody>
+      </p:sp>
+    </p:spTree>
+    <p:extLst>
+      <p:ext uri="{BB962C8B-B14F-4D97-AF65-F5344CB8AC3E}">
+        <p14:creationId xmlns:p14="http://schemas.microsoft.com/office/powerpoint/2010/main" val="3357777262"/>
+      </p:ext>
+    </p:extLst>
+  </p:cSld>
+  <p:clrMapOvr>
+    <a:overrideClrMapping bg1="dk1" tx1="lt1" bg2="dk2" tx2="lt2" accent1="accent1" accent2="accent2" accent3="accent3" accent4="accent4" accent5="accent5" accent6="accent6" hlink="hlink" folHlink="folHlink"/>
+  </p:clrMapOvr>
+</p:sldLayout>
+</file>
+
+<file path=ppt/slideLayouts/slideLayout3.xml><?xml version="1.0" encoding="utf-8"?>
+<p:sldLayout xmlns:a="http://schemas.openxmlformats.org/drawingml/2006/main" xmlns:r="http://schemas.openxmlformats.org/officeDocument/2006/relationships" xmlns:p="http://schemas.openxmlformats.org/presentationml/2006/main" showMasterSp="0" preserve="1" userDrawn="1">
+  <p:cSld name="Title Slide">
+    <p:spTree>
+      <p:nvGrpSpPr>
+        <p:cNvPr id="1" name=""/>
+        <p:cNvGrpSpPr/>
+        <p:nvPr/>
+      </p:nvGrpSpPr>
+      <p:grpSpPr>
+        <a:xfrm>
+          <a:off x="0" y="0"/>
+          <a:ext cx="0" cy="0"/>
+          <a:chOff x="0" y="0"/>
+          <a:chExt cx="0" cy="0"/>
+        </a:xfrm>
+      </p:grpSpPr>
+      <p:sp>
+        <p:nvSpPr>
+          <p:cNvPr id="7" name="Rectangle 6"/>
+          <p:cNvSpPr/>
+          <p:nvPr/>
+        </p:nvSpPr>
+        <p:spPr>
+          <a:xfrm>
+            <a:off x="3175" y="6400800"/>
+            <a:ext cx="12188825" cy="457200"/>
+          </a:xfrm>
+          <a:prstGeom prst="rect">
+            <a:avLst/>
+          </a:prstGeom>
+          <a:solidFill>
+            <a:schemeClr val="accent2"/>
+          </a:solidFill>
+          <a:ln>
+            <a:noFill/>
+          </a:ln>
+        </p:spPr>
+        <p:style>
+          <a:lnRef idx="2">
+            <a:schemeClr val="accent1">
+              <a:shade val="50000"/>
+            </a:schemeClr>
+          </a:lnRef>
+          <a:fillRef idx="1">
+            <a:schemeClr val="accent1"/>
+          </a:fillRef>
+          <a:effectRef idx="0">
+            <a:schemeClr val="accent1"/>
+          </a:effectRef>
+          <a:fontRef idx="minor">
+            <a:schemeClr val="lt1"/>
+          </a:fontRef>
+        </p:style>
+        <p:txBody>
+          <a:bodyPr/>
+          <a:lstStyle/>
+          <a:p>
+            <a:endParaRPr lang="en-US"/>
+          </a:p>
+        </p:txBody>
+      </p:sp>
+      <p:sp>
+        <p:nvSpPr>
+          <p:cNvPr id="8" name="Rectangle 7"/>
+          <p:cNvSpPr/>
+          <p:nvPr/>
+        </p:nvSpPr>
+        <p:spPr>
+          <a:xfrm>
+            <a:off x="15" y="6334316"/>
+            <a:ext cx="12188825" cy="64008"/>
+          </a:xfrm>
+          <a:prstGeom prst="rect">
+            <a:avLst/>
+          </a:prstGeom>
+          <a:solidFill>
+            <a:schemeClr val="accent1"/>
+          </a:solidFill>
+          <a:ln>
+            <a:noFill/>
+          </a:ln>
+        </p:spPr>
+        <p:style>
+          <a:lnRef idx="2">
+            <a:schemeClr val="accent1">
+              <a:shade val="50000"/>
+            </a:schemeClr>
+          </a:lnRef>
+          <a:fillRef idx="1">
+            <a:schemeClr val="accent1"/>
+          </a:fillRef>
+          <a:effectRef idx="0">
+            <a:schemeClr val="accent1"/>
+          </a:effectRef>
+          <a:fontRef idx="minor">
+            <a:schemeClr val="lt1"/>
+          </a:fontRef>
+        </p:style>
+        <p:txBody>
+          <a:bodyPr/>
+          <a:lstStyle/>
+          <a:p>
+            <a:endParaRPr lang="en-US"/>
+          </a:p>
+        </p:txBody>
+      </p:sp>
+      <p:sp>
+        <p:nvSpPr>
           <p:cNvPr id="2" name="Title 1"/>
           <p:cNvSpPr>
             <a:spLocks noGrp="1"/>
@@ -333,7 +1671,7 @@
           <a:p>
             <a:fld id="{2C5A4276-9034-4F68-8B2D-8D580C8476C4}" type="datetimeFigureOut">
               <a:rPr lang="en-US" smtClean="0"/>
-              <a:t>10/14/2025</a:t>
+              <a:t>10/16/2025</a:t>
             </a:fld>
             <a:endParaRPr lang="en-US"/>
           </a:p>
@@ -419,6 +1757,68 @@
           </a:fontRef>
         </p:style>
       </p:cxnSp>
+      <p:sp>
+        <p:nvSpPr>
+          <p:cNvPr id="11" name="Content Placeholder 10">
+            <a:extLst>
+              <a:ext uri="{FF2B5EF4-FFF2-40B4-BE49-F238E27FC236}">
+                <a16:creationId xmlns:a16="http://schemas.microsoft.com/office/drawing/2014/main" id="{3DBFF879-BC7C-A02D-6CB3-931979FF80DE}"/>
+              </a:ext>
+            </a:extLst>
+          </p:cNvPr>
+          <p:cNvSpPr>
+            <a:spLocks noGrp="1"/>
+          </p:cNvSpPr>
+          <p:nvPr>
+            <p:ph sz="quarter" idx="13"/>
+          </p:nvPr>
+        </p:nvSpPr>
+        <p:spPr>
+          <a:xfrm>
+            <a:off x="1096963" y="758825"/>
+            <a:ext cx="10058400" cy="3584575"/>
+          </a:xfrm>
+        </p:spPr>
+        <p:txBody>
+          <a:bodyPr/>
+          <a:lstStyle/>
+          <a:p>
+            <a:pPr lvl="0"/>
+            <a:r>
+              <a:rPr lang="en-US"/>
+              <a:t>Click to edit Master text styles</a:t>
+            </a:r>
+          </a:p>
+          <a:p>
+            <a:pPr lvl="1"/>
+            <a:r>
+              <a:rPr lang="en-US"/>
+              <a:t>Second level</a:t>
+            </a:r>
+          </a:p>
+          <a:p>
+            <a:pPr lvl="2"/>
+            <a:r>
+              <a:rPr lang="en-US"/>
+              <a:t>Third level</a:t>
+            </a:r>
+          </a:p>
+          <a:p>
+            <a:pPr lvl="3"/>
+            <a:r>
+              <a:rPr lang="en-US"/>
+              <a:t>Fourth level</a:t>
+            </a:r>
+          </a:p>
+          <a:p>
+            <a:pPr lvl="4"/>
+            <a:r>
+              <a:rPr lang="en-US"/>
+              <a:t>Fifth level</a:t>
+            </a:r>
+          </a:p>
+        </p:txBody>
+      </p:sp>
     </p:spTree>
     <p:extLst>
       <p:ext uri="{BB962C8B-B14F-4D97-AF65-F5344CB8AC3E}">
@@ -432,179 +1832,17 @@
 </p:sldLayout>
 </file>
 
-<file path=ppt/slideLayouts/slideLayout10.xml><?xml version="1.0" encoding="utf-8"?>
-<p:sldLayout xmlns:a="http://schemas.openxmlformats.org/drawingml/2006/main" xmlns:r="http://schemas.openxmlformats.org/officeDocument/2006/relationships" xmlns:p="http://schemas.openxmlformats.org/presentationml/2006/main" type="vertTx" preserve="1">
-  <p:cSld name="Title and Vertical Text">
-    <p:spTree>
-      <p:nvGrpSpPr>
-        <p:cNvPr id="1" name=""/>
-        <p:cNvGrpSpPr/>
-        <p:nvPr/>
-      </p:nvGrpSpPr>
-      <p:grpSpPr>
-        <a:xfrm>
-          <a:off x="0" y="0"/>
-          <a:ext cx="0" cy="0"/>
-          <a:chOff x="0" y="0"/>
-          <a:chExt cx="0" cy="0"/>
-        </a:xfrm>
-      </p:grpSpPr>
-      <p:sp>
-        <p:nvSpPr>
-          <p:cNvPr id="2" name="Title 1"/>
-          <p:cNvSpPr>
-            <a:spLocks noGrp="1"/>
-          </p:cNvSpPr>
-          <p:nvPr>
-            <p:ph type="title"/>
-          </p:nvPr>
-        </p:nvSpPr>
-        <p:spPr/>
-        <p:txBody>
-          <a:bodyPr/>
-          <a:lstStyle/>
-          <a:p>
-            <a:r>
-              <a:rPr lang="en-US"/>
-              <a:t>Click to edit Master title style</a:t>
-            </a:r>
-            <a:endParaRPr lang="en-US" dirty="0"/>
-          </a:p>
-        </p:txBody>
-      </p:sp>
-      <p:sp>
-        <p:nvSpPr>
-          <p:cNvPr id="3" name="Vertical Text Placeholder 2"/>
-          <p:cNvSpPr>
-            <a:spLocks noGrp="1"/>
-          </p:cNvSpPr>
-          <p:nvPr>
-            <p:ph type="body" orient="vert" idx="1"/>
-          </p:nvPr>
-        </p:nvSpPr>
-        <p:spPr/>
-        <p:txBody>
-          <a:bodyPr vert="eaVert" lIns="45720" tIns="0" rIns="45720" bIns="0"/>
-          <a:lstStyle/>
-          <a:p>
-            <a:pPr lvl="0"/>
-            <a:r>
-              <a:rPr lang="en-US"/>
-              <a:t>Click to edit Master text styles</a:t>
-            </a:r>
-          </a:p>
-          <a:p>
-            <a:pPr lvl="1"/>
-            <a:r>
-              <a:rPr lang="en-US"/>
-              <a:t>Second level</a:t>
-            </a:r>
-          </a:p>
-          <a:p>
-            <a:pPr lvl="2"/>
-            <a:r>
-              <a:rPr lang="en-US"/>
-              <a:t>Third level</a:t>
-            </a:r>
-          </a:p>
-          <a:p>
-            <a:pPr lvl="3"/>
-            <a:r>
-              <a:rPr lang="en-US"/>
-              <a:t>Fourth level</a:t>
-            </a:r>
-          </a:p>
-          <a:p>
-            <a:pPr lvl="4"/>
-            <a:r>
-              <a:rPr lang="en-US"/>
-              <a:t>Fifth level</a:t>
-            </a:r>
-            <a:endParaRPr lang="en-US" dirty="0"/>
-          </a:p>
-        </p:txBody>
-      </p:sp>
-      <p:sp>
-        <p:nvSpPr>
-          <p:cNvPr id="4" name="Date Placeholder 3"/>
-          <p:cNvSpPr>
-            <a:spLocks noGrp="1"/>
-          </p:cNvSpPr>
-          <p:nvPr>
-            <p:ph type="dt" sz="half" idx="10"/>
-          </p:nvPr>
-        </p:nvSpPr>
-        <p:spPr/>
-        <p:txBody>
-          <a:bodyPr/>
-          <a:lstStyle/>
-          <a:p>
-            <a:fld id="{2C5A4276-9034-4F68-8B2D-8D580C8476C4}" type="datetimeFigureOut">
-              <a:rPr lang="en-US" smtClean="0"/>
-              <a:t>10/14/2025</a:t>
-            </a:fld>
-            <a:endParaRPr lang="en-US"/>
-          </a:p>
-        </p:txBody>
-      </p:sp>
-      <p:sp>
-        <p:nvSpPr>
-          <p:cNvPr id="5" name="Footer Placeholder 4"/>
-          <p:cNvSpPr>
-            <a:spLocks noGrp="1"/>
-          </p:cNvSpPr>
-          <p:nvPr>
-            <p:ph type="ftr" sz="quarter" idx="11"/>
-          </p:nvPr>
-        </p:nvSpPr>
-        <p:spPr/>
-        <p:txBody>
-          <a:bodyPr/>
-          <a:lstStyle/>
-          <a:p>
-            <a:endParaRPr lang="en-US"/>
-          </a:p>
-        </p:txBody>
-      </p:sp>
-      <p:sp>
-        <p:nvSpPr>
-          <p:cNvPr id="6" name="Slide Number Placeholder 5"/>
-          <p:cNvSpPr>
-            <a:spLocks noGrp="1"/>
-          </p:cNvSpPr>
-          <p:nvPr>
-            <p:ph type="sldNum" sz="quarter" idx="12"/>
-          </p:nvPr>
-        </p:nvSpPr>
-        <p:spPr/>
-        <p:txBody>
-          <a:bodyPr/>
-          <a:lstStyle/>
-          <a:p>
-            <a:fld id="{51F9AB11-5268-4777-85B6-D98FC480BF1C}" type="slidenum">
-              <a:rPr lang="en-US" smtClean="0"/>
-              <a:t>‹#›</a:t>
-            </a:fld>
-            <a:endParaRPr lang="en-US"/>
-          </a:p>
-        </p:txBody>
-      </p:sp>
-    </p:spTree>
-    <p:extLst>
-      <p:ext uri="{BB962C8B-B14F-4D97-AF65-F5344CB8AC3E}">
-        <p14:creationId xmlns:p14="http://schemas.microsoft.com/office/powerpoint/2010/main" val="2955095806"/>
-      </p:ext>
-    </p:extLst>
-  </p:cSld>
-  <p:clrMapOvr>
-    <a:masterClrMapping/>
-  </p:clrMapOvr>
-</p:sldLayout>
-</file>
-
-<file path=ppt/slideLayouts/slideLayout11.xml><?xml version="1.0" encoding="utf-8"?>
-<p:sldLayout xmlns:a="http://schemas.openxmlformats.org/drawingml/2006/main" xmlns:r="http://schemas.openxmlformats.org/officeDocument/2006/relationships" xmlns:p="http://schemas.openxmlformats.org/presentationml/2006/main" showMasterSp="0" type="vertTitleAndTx" preserve="1">
-  <p:cSld name="Vertical Title and Text">
+<file path=ppt/slideLayouts/slideLayout4.xml><?xml version="1.0" encoding="utf-8"?>
+<p:sldLayout xmlns:a="http://schemas.openxmlformats.org/drawingml/2006/main" xmlns:r="http://schemas.openxmlformats.org/officeDocument/2006/relationships" xmlns:p="http://schemas.openxmlformats.org/presentationml/2006/main" showMasterSp="0" type="secHead" preserve="1">
+  <p:cSld name="Section Header">
+    <p:bg>
+      <p:bgPr>
+        <a:solidFill>
+          <a:schemeClr val="bg1"/>
+        </a:solidFill>
+        <a:effectLst/>
+      </p:bgPr>
+    </p:bg>
     <p:spTree>
       <p:nvGrpSpPr>
         <p:cNvPr id="1" name=""/>
@@ -697,444 +1935,6 @@
       </p:sp>
       <p:sp>
         <p:nvSpPr>
-          <p:cNvPr id="2" name="Vertical Title 1"/>
-          <p:cNvSpPr>
-            <a:spLocks noGrp="1"/>
-          </p:cNvSpPr>
-          <p:nvPr>
-            <p:ph type="title" orient="vert"/>
-          </p:nvPr>
-        </p:nvSpPr>
-        <p:spPr>
-          <a:xfrm>
-            <a:off x="8724900" y="414778"/>
-            <a:ext cx="2628900" cy="5757421"/>
-          </a:xfrm>
-        </p:spPr>
-        <p:txBody>
-          <a:bodyPr vert="eaVert"/>
-          <a:lstStyle/>
-          <a:p>
-            <a:r>
-              <a:rPr lang="en-US"/>
-              <a:t>Click to edit Master title style</a:t>
-            </a:r>
-            <a:endParaRPr lang="en-US" dirty="0"/>
-          </a:p>
-        </p:txBody>
-      </p:sp>
-      <p:sp>
-        <p:nvSpPr>
-          <p:cNvPr id="3" name="Vertical Text Placeholder 2"/>
-          <p:cNvSpPr>
-            <a:spLocks noGrp="1"/>
-          </p:cNvSpPr>
-          <p:nvPr>
-            <p:ph type="body" orient="vert" idx="1"/>
-          </p:nvPr>
-        </p:nvSpPr>
-        <p:spPr>
-          <a:xfrm>
-            <a:off x="838200" y="414778"/>
-            <a:ext cx="7734300" cy="5757422"/>
-          </a:xfrm>
-        </p:spPr>
-        <p:txBody>
-          <a:bodyPr vert="eaVert" lIns="45720" tIns="0" rIns="45720" bIns="0"/>
-          <a:lstStyle/>
-          <a:p>
-            <a:pPr lvl="0"/>
-            <a:r>
-              <a:rPr lang="en-US"/>
-              <a:t>Click to edit Master text styles</a:t>
-            </a:r>
-          </a:p>
-          <a:p>
-            <a:pPr lvl="1"/>
-            <a:r>
-              <a:rPr lang="en-US"/>
-              <a:t>Second level</a:t>
-            </a:r>
-          </a:p>
-          <a:p>
-            <a:pPr lvl="2"/>
-            <a:r>
-              <a:rPr lang="en-US"/>
-              <a:t>Third level</a:t>
-            </a:r>
-          </a:p>
-          <a:p>
-            <a:pPr lvl="3"/>
-            <a:r>
-              <a:rPr lang="en-US"/>
-              <a:t>Fourth level</a:t>
-            </a:r>
-          </a:p>
-          <a:p>
-            <a:pPr lvl="4"/>
-            <a:r>
-              <a:rPr lang="en-US"/>
-              <a:t>Fifth level</a:t>
-            </a:r>
-            <a:endParaRPr lang="en-US" dirty="0"/>
-          </a:p>
-        </p:txBody>
-      </p:sp>
-      <p:sp>
-        <p:nvSpPr>
-          <p:cNvPr id="4" name="Date Placeholder 3"/>
-          <p:cNvSpPr>
-            <a:spLocks noGrp="1"/>
-          </p:cNvSpPr>
-          <p:nvPr>
-            <p:ph type="dt" sz="half" idx="10"/>
-          </p:nvPr>
-        </p:nvSpPr>
-        <p:spPr/>
-        <p:txBody>
-          <a:bodyPr/>
-          <a:lstStyle/>
-          <a:p>
-            <a:fld id="{2C5A4276-9034-4F68-8B2D-8D580C8476C4}" type="datetimeFigureOut">
-              <a:rPr lang="en-US" smtClean="0"/>
-              <a:t>10/14/2025</a:t>
-            </a:fld>
-            <a:endParaRPr lang="en-US"/>
-          </a:p>
-        </p:txBody>
-      </p:sp>
-      <p:sp>
-        <p:nvSpPr>
-          <p:cNvPr id="5" name="Footer Placeholder 4"/>
-          <p:cNvSpPr>
-            <a:spLocks noGrp="1"/>
-          </p:cNvSpPr>
-          <p:nvPr>
-            <p:ph type="ftr" sz="quarter" idx="11"/>
-          </p:nvPr>
-        </p:nvSpPr>
-        <p:spPr/>
-        <p:txBody>
-          <a:bodyPr/>
-          <a:lstStyle/>
-          <a:p>
-            <a:endParaRPr lang="en-US"/>
-          </a:p>
-        </p:txBody>
-      </p:sp>
-      <p:sp>
-        <p:nvSpPr>
-          <p:cNvPr id="6" name="Slide Number Placeholder 5"/>
-          <p:cNvSpPr>
-            <a:spLocks noGrp="1"/>
-          </p:cNvSpPr>
-          <p:nvPr>
-            <p:ph type="sldNum" sz="quarter" idx="12"/>
-          </p:nvPr>
-        </p:nvSpPr>
-        <p:spPr/>
-        <p:txBody>
-          <a:bodyPr/>
-          <a:lstStyle/>
-          <a:p>
-            <a:fld id="{51F9AB11-5268-4777-85B6-D98FC480BF1C}" type="slidenum">
-              <a:rPr lang="en-US" smtClean="0"/>
-              <a:t>‹#›</a:t>
-            </a:fld>
-            <a:endParaRPr lang="en-US"/>
-          </a:p>
-        </p:txBody>
-      </p:sp>
-    </p:spTree>
-    <p:extLst>
-      <p:ext uri="{BB962C8B-B14F-4D97-AF65-F5344CB8AC3E}">
-        <p14:creationId xmlns:p14="http://schemas.microsoft.com/office/powerpoint/2010/main" val="3657699035"/>
-      </p:ext>
-    </p:extLst>
-  </p:cSld>
-  <p:clrMapOvr>
-    <a:masterClrMapping/>
-  </p:clrMapOvr>
-</p:sldLayout>
-</file>
-
-<file path=ppt/slideLayouts/slideLayout2.xml><?xml version="1.0" encoding="utf-8"?>
-<p:sldLayout xmlns:a="http://schemas.openxmlformats.org/drawingml/2006/main" xmlns:r="http://schemas.openxmlformats.org/officeDocument/2006/relationships" xmlns:p="http://schemas.openxmlformats.org/presentationml/2006/main" type="obj" preserve="1">
-  <p:cSld name="Title and Content">
-    <p:spTree>
-      <p:nvGrpSpPr>
-        <p:cNvPr id="1" name=""/>
-        <p:cNvGrpSpPr/>
-        <p:nvPr/>
-      </p:nvGrpSpPr>
-      <p:grpSpPr>
-        <a:xfrm>
-          <a:off x="0" y="0"/>
-          <a:ext cx="0" cy="0"/>
-          <a:chOff x="0" y="0"/>
-          <a:chExt cx="0" cy="0"/>
-        </a:xfrm>
-      </p:grpSpPr>
-      <p:sp>
-        <p:nvSpPr>
-          <p:cNvPr id="2" name="Title 1"/>
-          <p:cNvSpPr>
-            <a:spLocks noGrp="1"/>
-          </p:cNvSpPr>
-          <p:nvPr>
-            <p:ph type="title"/>
-          </p:nvPr>
-        </p:nvSpPr>
-        <p:spPr/>
-        <p:txBody>
-          <a:bodyPr/>
-          <a:lstStyle>
-            <a:lvl1pPr marL="0">
-              <a:defRPr/>
-            </a:lvl1pPr>
-          </a:lstStyle>
-          <a:p>
-            <a:r>
-              <a:rPr lang="en-US"/>
-              <a:t>Click to edit Master title style</a:t>
-            </a:r>
-            <a:endParaRPr lang="en-US" dirty="0"/>
-          </a:p>
-        </p:txBody>
-      </p:sp>
-      <p:sp>
-        <p:nvSpPr>
-          <p:cNvPr id="3" name="Content Placeholder 2"/>
-          <p:cNvSpPr>
-            <a:spLocks noGrp="1"/>
-          </p:cNvSpPr>
-          <p:nvPr>
-            <p:ph idx="1"/>
-          </p:nvPr>
-        </p:nvSpPr>
-        <p:spPr/>
-        <p:txBody>
-          <a:bodyPr/>
-          <a:lstStyle/>
-          <a:p>
-            <a:pPr lvl="0"/>
-            <a:r>
-              <a:rPr lang="en-US"/>
-              <a:t>Click to edit Master text styles</a:t>
-            </a:r>
-          </a:p>
-          <a:p>
-            <a:pPr lvl="1"/>
-            <a:r>
-              <a:rPr lang="en-US"/>
-              <a:t>Second level</a:t>
-            </a:r>
-          </a:p>
-          <a:p>
-            <a:pPr lvl="2"/>
-            <a:r>
-              <a:rPr lang="en-US"/>
-              <a:t>Third level</a:t>
-            </a:r>
-          </a:p>
-          <a:p>
-            <a:pPr lvl="3"/>
-            <a:r>
-              <a:rPr lang="en-US"/>
-              <a:t>Fourth level</a:t>
-            </a:r>
-          </a:p>
-          <a:p>
-            <a:pPr lvl="4"/>
-            <a:r>
-              <a:rPr lang="en-US"/>
-              <a:t>Fifth level</a:t>
-            </a:r>
-            <a:endParaRPr lang="en-US" dirty="0"/>
-          </a:p>
-        </p:txBody>
-      </p:sp>
-      <p:sp>
-        <p:nvSpPr>
-          <p:cNvPr id="4" name="Date Placeholder 3"/>
-          <p:cNvSpPr>
-            <a:spLocks noGrp="1"/>
-          </p:cNvSpPr>
-          <p:nvPr>
-            <p:ph type="dt" sz="half" idx="10"/>
-          </p:nvPr>
-        </p:nvSpPr>
-        <p:spPr/>
-        <p:txBody>
-          <a:bodyPr/>
-          <a:lstStyle/>
-          <a:p>
-            <a:fld id="{2C5A4276-9034-4F68-8B2D-8D580C8476C4}" type="datetimeFigureOut">
-              <a:rPr lang="en-US" smtClean="0"/>
-              <a:t>10/14/2025</a:t>
-            </a:fld>
-            <a:endParaRPr lang="en-US"/>
-          </a:p>
-        </p:txBody>
-      </p:sp>
-      <p:sp>
-        <p:nvSpPr>
-          <p:cNvPr id="5" name="Footer Placeholder 4"/>
-          <p:cNvSpPr>
-            <a:spLocks noGrp="1"/>
-          </p:cNvSpPr>
-          <p:nvPr>
-            <p:ph type="ftr" sz="quarter" idx="11"/>
-          </p:nvPr>
-        </p:nvSpPr>
-        <p:spPr/>
-        <p:txBody>
-          <a:bodyPr/>
-          <a:lstStyle/>
-          <a:p>
-            <a:endParaRPr lang="en-US"/>
-          </a:p>
-        </p:txBody>
-      </p:sp>
-      <p:sp>
-        <p:nvSpPr>
-          <p:cNvPr id="6" name="Slide Number Placeholder 5"/>
-          <p:cNvSpPr>
-            <a:spLocks noGrp="1"/>
-          </p:cNvSpPr>
-          <p:nvPr>
-            <p:ph type="sldNum" sz="quarter" idx="12"/>
-          </p:nvPr>
-        </p:nvSpPr>
-        <p:spPr/>
-        <p:txBody>
-          <a:bodyPr/>
-          <a:lstStyle/>
-          <a:p>
-            <a:fld id="{51F9AB11-5268-4777-85B6-D98FC480BF1C}" type="slidenum">
-              <a:rPr lang="en-US" smtClean="0"/>
-              <a:t>‹#›</a:t>
-            </a:fld>
-            <a:endParaRPr lang="en-US"/>
-          </a:p>
-        </p:txBody>
-      </p:sp>
-    </p:spTree>
-    <p:extLst>
-      <p:ext uri="{BB962C8B-B14F-4D97-AF65-F5344CB8AC3E}">
-        <p14:creationId xmlns:p14="http://schemas.microsoft.com/office/powerpoint/2010/main" val="4145143861"/>
-      </p:ext>
-    </p:extLst>
-  </p:cSld>
-  <p:clrMapOvr>
-    <a:masterClrMapping/>
-  </p:clrMapOvr>
-</p:sldLayout>
-</file>
-
-<file path=ppt/slideLayouts/slideLayout3.xml><?xml version="1.0" encoding="utf-8"?>
-<p:sldLayout xmlns:a="http://schemas.openxmlformats.org/drawingml/2006/main" xmlns:r="http://schemas.openxmlformats.org/officeDocument/2006/relationships" xmlns:p="http://schemas.openxmlformats.org/presentationml/2006/main" showMasterSp="0" type="secHead" preserve="1">
-  <p:cSld name="Section Header">
-    <p:bg>
-      <p:bgPr>
-        <a:solidFill>
-          <a:schemeClr val="bg1"/>
-        </a:solidFill>
-        <a:effectLst/>
-      </p:bgPr>
-    </p:bg>
-    <p:spTree>
-      <p:nvGrpSpPr>
-        <p:cNvPr id="1" name=""/>
-        <p:cNvGrpSpPr/>
-        <p:nvPr/>
-      </p:nvGrpSpPr>
-      <p:grpSpPr>
-        <a:xfrm>
-          <a:off x="0" y="0"/>
-          <a:ext cx="0" cy="0"/>
-          <a:chOff x="0" y="0"/>
-          <a:chExt cx="0" cy="0"/>
-        </a:xfrm>
-      </p:grpSpPr>
-      <p:sp>
-        <p:nvSpPr>
-          <p:cNvPr id="7" name="Rectangle 6"/>
-          <p:cNvSpPr/>
-          <p:nvPr/>
-        </p:nvSpPr>
-        <p:spPr>
-          <a:xfrm>
-            <a:off x="3175" y="6400800"/>
-            <a:ext cx="12188825" cy="457200"/>
-          </a:xfrm>
-          <a:prstGeom prst="rect">
-            <a:avLst/>
-          </a:prstGeom>
-          <a:solidFill>
-            <a:schemeClr val="accent2"/>
-          </a:solidFill>
-          <a:ln>
-            <a:noFill/>
-          </a:ln>
-        </p:spPr>
-        <p:style>
-          <a:lnRef idx="2">
-            <a:schemeClr val="accent1">
-              <a:shade val="50000"/>
-            </a:schemeClr>
-          </a:lnRef>
-          <a:fillRef idx="1">
-            <a:schemeClr val="accent1"/>
-          </a:fillRef>
-          <a:effectRef idx="0">
-            <a:schemeClr val="accent1"/>
-          </a:effectRef>
-          <a:fontRef idx="minor">
-            <a:schemeClr val="lt1"/>
-          </a:fontRef>
-        </p:style>
-      </p:sp>
-      <p:sp>
-        <p:nvSpPr>
-          <p:cNvPr id="8" name="Rectangle 7"/>
-          <p:cNvSpPr/>
-          <p:nvPr/>
-        </p:nvSpPr>
-        <p:spPr>
-          <a:xfrm>
-            <a:off x="15" y="6334316"/>
-            <a:ext cx="12188825" cy="64008"/>
-          </a:xfrm>
-          <a:prstGeom prst="rect">
-            <a:avLst/>
-          </a:prstGeom>
-          <a:solidFill>
-            <a:schemeClr val="accent1"/>
-          </a:solidFill>
-          <a:ln>
-            <a:noFill/>
-          </a:ln>
-        </p:spPr>
-        <p:style>
-          <a:lnRef idx="2">
-            <a:schemeClr val="accent1">
-              <a:shade val="50000"/>
-            </a:schemeClr>
-          </a:lnRef>
-          <a:fillRef idx="1">
-            <a:schemeClr val="accent1"/>
-          </a:fillRef>
-          <a:effectRef idx="0">
-            <a:schemeClr val="accent1"/>
-          </a:effectRef>
-          <a:fontRef idx="minor">
-            <a:schemeClr val="lt1"/>
-          </a:fontRef>
-        </p:style>
-      </p:sp>
-      <p:sp>
-        <p:nvSpPr>
           <p:cNvPr id="2" name="Title 1"/>
           <p:cNvSpPr>
             <a:spLocks noGrp="1"/>
@@ -1314,7 +2114,7 @@
           <a:p>
             <a:fld id="{2C5A4276-9034-4F68-8B2D-8D580C8476C4}" type="datetimeFigureOut">
               <a:rPr lang="en-US" smtClean="0"/>
-              <a:t>10/14/2025</a:t>
+              <a:t>10/16/2025</a:t>
             </a:fld>
             <a:endParaRPr lang="en-US"/>
           </a:p>
@@ -1413,7 +2213,7 @@
 </p:sldLayout>
 </file>
 
-<file path=ppt/slideLayouts/slideLayout4.xml><?xml version="1.0" encoding="utf-8"?>
+<file path=ppt/slideLayouts/slideLayout5.xml><?xml version="1.0" encoding="utf-8"?>
 <p:sldLayout xmlns:a="http://schemas.openxmlformats.org/drawingml/2006/main" xmlns:r="http://schemas.openxmlformats.org/officeDocument/2006/relationships" xmlns:p="http://schemas.openxmlformats.org/presentationml/2006/main" type="twoObj" preserve="1">
   <p:cSld name="Two Content">
     <p:spTree>
@@ -1589,7 +2389,7 @@
           <a:p>
             <a:fld id="{2C5A4276-9034-4F68-8B2D-8D580C8476C4}" type="datetimeFigureOut">
               <a:rPr lang="en-US" smtClean="0"/>
-              <a:t>10/14/2025</a:t>
+              <a:t>10/16/2025</a:t>
             </a:fld>
             <a:endParaRPr lang="en-US"/>
           </a:p>
@@ -1650,7 +2450,7 @@
 </p:sldLayout>
 </file>
 
-<file path=ppt/slideLayouts/slideLayout5.xml><?xml version="1.0" encoding="utf-8"?>
+<file path=ppt/slideLayouts/slideLayout6.xml><?xml version="1.0" encoding="utf-8"?>
 <p:sldLayout xmlns:a="http://schemas.openxmlformats.org/drawingml/2006/main" xmlns:r="http://schemas.openxmlformats.org/officeDocument/2006/relationships" xmlns:p="http://schemas.openxmlformats.org/presentationml/2006/main" type="twoTxTwoObj" preserve="1">
   <p:cSld name="Comparison">
     <p:spTree>
@@ -1968,7 +2768,7 @@
           <a:p>
             <a:fld id="{2C5A4276-9034-4F68-8B2D-8D580C8476C4}" type="datetimeFigureOut">
               <a:rPr lang="en-US" smtClean="0"/>
-              <a:t>10/14/2025</a:t>
+              <a:t>10/16/2025</a:t>
             </a:fld>
             <a:endParaRPr lang="en-US"/>
           </a:p>
@@ -2029,7 +2829,7 @@
 </p:sldLayout>
 </file>
 
-<file path=ppt/slideLayouts/slideLayout6.xml><?xml version="1.0" encoding="utf-8"?>
+<file path=ppt/slideLayouts/slideLayout7.xml><?xml version="1.0" encoding="utf-8"?>
 <p:sldLayout xmlns:a="http://schemas.openxmlformats.org/drawingml/2006/main" xmlns:r="http://schemas.openxmlformats.org/officeDocument/2006/relationships" xmlns:p="http://schemas.openxmlformats.org/presentationml/2006/main" type="titleOnly" preserve="1">
   <p:cSld name="Title Only">
     <p:spTree>
@@ -2086,7 +2886,7 @@
           <a:p>
             <a:fld id="{2C5A4276-9034-4F68-8B2D-8D580C8476C4}" type="datetimeFigureOut">
               <a:rPr lang="en-US" smtClean="0"/>
-              <a:t>10/14/2025</a:t>
+              <a:t>10/16/2025</a:t>
             </a:fld>
             <a:endParaRPr lang="en-US"/>
           </a:p>
@@ -2147,7 +2947,7 @@
 </p:sldLayout>
 </file>
 
-<file path=ppt/slideLayouts/slideLayout7.xml><?xml version="1.0" encoding="utf-8"?>
+<file path=ppt/slideLayouts/slideLayout8.xml><?xml version="1.0" encoding="utf-8"?>
 <p:sldLayout xmlns:a="http://schemas.openxmlformats.org/drawingml/2006/main" xmlns:r="http://schemas.openxmlformats.org/officeDocument/2006/relationships" xmlns:p="http://schemas.openxmlformats.org/presentationml/2006/main" showMasterSp="0" type="blank" preserve="1">
   <p:cSld name="Blank">
     <p:spTree>
@@ -2257,7 +3057,7 @@
           <a:p>
             <a:fld id="{2C5A4276-9034-4F68-8B2D-8D580C8476C4}" type="datetimeFigureOut">
               <a:rPr lang="en-US" smtClean="0"/>
-              <a:t>10/14/2025</a:t>
+              <a:t>10/16/2025</a:t>
             </a:fld>
             <a:endParaRPr lang="en-US"/>
           </a:p>
@@ -2326,7 +3126,7 @@
 </p:sldLayout>
 </file>
 
-<file path=ppt/slideLayouts/slideLayout8.xml><?xml version="1.0" encoding="utf-8"?>
+<file path=ppt/slideLayouts/slideLayout9.xml><?xml version="1.0" encoding="utf-8"?>
 <p:sldLayout xmlns:a="http://schemas.openxmlformats.org/drawingml/2006/main" xmlns:r="http://schemas.openxmlformats.org/officeDocument/2006/relationships" xmlns:p="http://schemas.openxmlformats.org/presentationml/2006/main" showMasterSp="0" type="objTx" preserve="1">
   <p:cSld name="Content with Caption">
     <p:spTree>
@@ -2611,7 +3411,7 @@
           <a:p>
             <a:fld id="{2C5A4276-9034-4F68-8B2D-8D580C8476C4}" type="datetimeFigureOut">
               <a:rPr lang="en-US" smtClean="0"/>
-              <a:t>10/14/2025</a:t>
+              <a:t>10/16/2025</a:t>
             </a:fld>
             <a:endParaRPr lang="en-US"/>
           </a:p>
@@ -2684,367 +3484,6 @@
     <p:extLst>
       <p:ext uri="{BB962C8B-B14F-4D97-AF65-F5344CB8AC3E}">
         <p14:creationId xmlns:p14="http://schemas.microsoft.com/office/powerpoint/2010/main" val="151086814"/>
-      </p:ext>
-    </p:extLst>
-  </p:cSld>
-  <p:clrMapOvr>
-    <a:masterClrMapping/>
-  </p:clrMapOvr>
-</p:sldLayout>
-</file>
-
-<file path=ppt/slideLayouts/slideLayout9.xml><?xml version="1.0" encoding="utf-8"?>
-<p:sldLayout xmlns:a="http://schemas.openxmlformats.org/drawingml/2006/main" xmlns:r="http://schemas.openxmlformats.org/officeDocument/2006/relationships" xmlns:p="http://schemas.openxmlformats.org/presentationml/2006/main" showMasterSp="0" type="picTx" preserve="1">
-  <p:cSld name="Picture with Caption">
-    <p:spTree>
-      <p:nvGrpSpPr>
-        <p:cNvPr id="1" name=""/>
-        <p:cNvGrpSpPr/>
-        <p:nvPr/>
-      </p:nvGrpSpPr>
-      <p:grpSpPr>
-        <a:xfrm>
-          <a:off x="0" y="0"/>
-          <a:ext cx="0" cy="0"/>
-          <a:chOff x="0" y="0"/>
-          <a:chExt cx="0" cy="0"/>
-        </a:xfrm>
-      </p:grpSpPr>
-      <p:sp>
-        <p:nvSpPr>
-          <p:cNvPr id="8" name="Rectangle 7"/>
-          <p:cNvSpPr/>
-          <p:nvPr/>
-        </p:nvSpPr>
-        <p:spPr>
-          <a:xfrm>
-            <a:off x="0" y="4953000"/>
-            <a:ext cx="12188825" cy="1905000"/>
-          </a:xfrm>
-          <a:prstGeom prst="rect">
-            <a:avLst/>
-          </a:prstGeom>
-          <a:solidFill>
-            <a:schemeClr val="accent2"/>
-          </a:solidFill>
-          <a:ln>
-            <a:noFill/>
-          </a:ln>
-        </p:spPr>
-        <p:style>
-          <a:lnRef idx="2">
-            <a:schemeClr val="accent1">
-              <a:shade val="50000"/>
-            </a:schemeClr>
-          </a:lnRef>
-          <a:fillRef idx="1">
-            <a:schemeClr val="accent1"/>
-          </a:fillRef>
-          <a:effectRef idx="0">
-            <a:schemeClr val="accent1"/>
-          </a:effectRef>
-          <a:fontRef idx="minor">
-            <a:schemeClr val="lt1"/>
-          </a:fontRef>
-        </p:style>
-      </p:sp>
-      <p:sp>
-        <p:nvSpPr>
-          <p:cNvPr id="9" name="Rectangle 8"/>
-          <p:cNvSpPr/>
-          <p:nvPr/>
-        </p:nvSpPr>
-        <p:spPr>
-          <a:xfrm>
-            <a:off x="15" y="4915076"/>
-            <a:ext cx="12188825" cy="64008"/>
-          </a:xfrm>
-          <a:prstGeom prst="rect">
-            <a:avLst/>
-          </a:prstGeom>
-          <a:solidFill>
-            <a:schemeClr val="accent1"/>
-          </a:solidFill>
-          <a:ln>
-            <a:noFill/>
-          </a:ln>
-        </p:spPr>
-        <p:style>
-          <a:lnRef idx="2">
-            <a:schemeClr val="accent1">
-              <a:shade val="50000"/>
-            </a:schemeClr>
-          </a:lnRef>
-          <a:fillRef idx="1">
-            <a:schemeClr val="accent1"/>
-          </a:fillRef>
-          <a:effectRef idx="0">
-            <a:schemeClr val="accent1"/>
-          </a:effectRef>
-          <a:fontRef idx="minor">
-            <a:schemeClr val="lt1"/>
-          </a:fontRef>
-        </p:style>
-      </p:sp>
-      <p:sp>
-        <p:nvSpPr>
-          <p:cNvPr id="2" name="Title 1"/>
-          <p:cNvSpPr>
-            <a:spLocks noGrp="1"/>
-          </p:cNvSpPr>
-          <p:nvPr>
-            <p:ph type="title"/>
-          </p:nvPr>
-        </p:nvSpPr>
-        <p:spPr>
-          <a:xfrm>
-            <a:off x="1097280" y="5074920"/>
-            <a:ext cx="10113264" cy="822960"/>
-          </a:xfrm>
-        </p:spPr>
-        <p:txBody>
-          <a:bodyPr lIns="91440" tIns="0" rIns="91440" bIns="0" anchor="b">
-            <a:noAutofit/>
-          </a:bodyPr>
-          <a:lstStyle>
-            <a:lvl1pPr>
-              <a:defRPr sz="3600" b="0">
-                <a:solidFill>
-                  <a:srgbClr val="FFFFFF"/>
-                </a:solidFill>
-              </a:defRPr>
-            </a:lvl1pPr>
-          </a:lstStyle>
-          <a:p>
-            <a:r>
-              <a:rPr lang="en-US"/>
-              <a:t>Click to edit Master title style</a:t>
-            </a:r>
-            <a:endParaRPr lang="en-US" dirty="0"/>
-          </a:p>
-        </p:txBody>
-      </p:sp>
-      <p:sp>
-        <p:nvSpPr>
-          <p:cNvPr id="3" name="Picture Placeholder 2"/>
-          <p:cNvSpPr>
-            <a:spLocks noGrp="1" noChangeAspect="1"/>
-          </p:cNvSpPr>
-          <p:nvPr>
-            <p:ph type="pic" idx="1"/>
-          </p:nvPr>
-        </p:nvSpPr>
-        <p:spPr>
-          <a:xfrm>
-            <a:off x="15" y="0"/>
-            <a:ext cx="12191985" cy="4915076"/>
-          </a:xfrm>
-          <a:blipFill>
-            <a:blip r:embed="rId2"/>
-            <a:stretch>
-              <a:fillRect/>
-            </a:stretch>
-          </a:blipFill>
-        </p:spPr>
-        <p:txBody>
-          <a:bodyPr lIns="457200" tIns="457200" anchor="t"/>
-          <a:lstStyle>
-            <a:lvl1pPr marL="0" indent="0">
-              <a:buNone/>
-              <a:defRPr sz="3200">
-                <a:solidFill>
-                  <a:schemeClr val="bg1"/>
-                </a:solidFill>
-              </a:defRPr>
-            </a:lvl1pPr>
-            <a:lvl2pPr marL="457200" indent="0">
-              <a:buNone/>
-              <a:defRPr sz="2800"/>
-            </a:lvl2pPr>
-            <a:lvl3pPr marL="914400" indent="0">
-              <a:buNone/>
-              <a:defRPr sz="2400"/>
-            </a:lvl3pPr>
-            <a:lvl4pPr marL="1371600" indent="0">
-              <a:buNone/>
-              <a:defRPr sz="2000"/>
-            </a:lvl4pPr>
-            <a:lvl5pPr marL="1828800" indent="0">
-              <a:buNone/>
-              <a:defRPr sz="2000"/>
-            </a:lvl5pPr>
-            <a:lvl6pPr marL="2286000" indent="0">
-              <a:buNone/>
-              <a:defRPr sz="2000"/>
-            </a:lvl6pPr>
-            <a:lvl7pPr marL="2743200" indent="0">
-              <a:buNone/>
-              <a:defRPr sz="2000"/>
-            </a:lvl7pPr>
-            <a:lvl8pPr marL="3200400" indent="0">
-              <a:buNone/>
-              <a:defRPr sz="2000"/>
-            </a:lvl8pPr>
-            <a:lvl9pPr marL="3657600" indent="0">
-              <a:buNone/>
-              <a:defRPr sz="2000"/>
-            </a:lvl9pPr>
-          </a:lstStyle>
-          <a:p>
-            <a:r>
-              <a:rPr lang="en-US"/>
-              <a:t>Click icon to add picture</a:t>
-            </a:r>
-            <a:endParaRPr lang="en-US" dirty="0"/>
-          </a:p>
-        </p:txBody>
-      </p:sp>
-      <p:sp>
-        <p:nvSpPr>
-          <p:cNvPr id="4" name="Text Placeholder 3"/>
-          <p:cNvSpPr>
-            <a:spLocks noGrp="1"/>
-          </p:cNvSpPr>
-          <p:nvPr>
-            <p:ph type="body" sz="half" idx="2"/>
-          </p:nvPr>
-        </p:nvSpPr>
-        <p:spPr>
-          <a:xfrm>
-            <a:off x="1097280" y="5907023"/>
-            <a:ext cx="10113264" cy="594360"/>
-          </a:xfrm>
-        </p:spPr>
-        <p:txBody>
-          <a:bodyPr lIns="91440" tIns="0" rIns="91440" bIns="0">
-            <a:normAutofit/>
-          </a:bodyPr>
-          <a:lstStyle>
-            <a:lvl1pPr marL="0" indent="0">
-              <a:spcBef>
-                <a:spcPts val="0"/>
-              </a:spcBef>
-              <a:spcAft>
-                <a:spcPts val="600"/>
-              </a:spcAft>
-              <a:buNone/>
-              <a:defRPr sz="1500">
-                <a:solidFill>
-                  <a:srgbClr val="FFFFFF"/>
-                </a:solidFill>
-              </a:defRPr>
-            </a:lvl1pPr>
-            <a:lvl2pPr marL="457200" indent="0">
-              <a:buNone/>
-              <a:defRPr sz="1200"/>
-            </a:lvl2pPr>
-            <a:lvl3pPr marL="914400" indent="0">
-              <a:buNone/>
-              <a:defRPr sz="1000"/>
-            </a:lvl3pPr>
-            <a:lvl4pPr marL="1371600" indent="0">
-              <a:buNone/>
-              <a:defRPr sz="900"/>
-            </a:lvl4pPr>
-            <a:lvl5pPr marL="1828800" indent="0">
-              <a:buNone/>
-              <a:defRPr sz="900"/>
-            </a:lvl5pPr>
-            <a:lvl6pPr marL="2286000" indent="0">
-              <a:buNone/>
-              <a:defRPr sz="900"/>
-            </a:lvl6pPr>
-            <a:lvl7pPr marL="2743200" indent="0">
-              <a:buNone/>
-              <a:defRPr sz="900"/>
-            </a:lvl7pPr>
-            <a:lvl8pPr marL="3200400" indent="0">
-              <a:buNone/>
-              <a:defRPr sz="900"/>
-            </a:lvl8pPr>
-            <a:lvl9pPr marL="3657600" indent="0">
-              <a:buNone/>
-              <a:defRPr sz="900"/>
-            </a:lvl9pPr>
-          </a:lstStyle>
-          <a:p>
-            <a:pPr lvl="0"/>
-            <a:r>
-              <a:rPr lang="en-US"/>
-              <a:t>Click to edit Master text styles</a:t>
-            </a:r>
-          </a:p>
-        </p:txBody>
-      </p:sp>
-      <p:sp>
-        <p:nvSpPr>
-          <p:cNvPr id="5" name="Date Placeholder 4"/>
-          <p:cNvSpPr>
-            <a:spLocks noGrp="1"/>
-          </p:cNvSpPr>
-          <p:nvPr>
-            <p:ph type="dt" sz="half" idx="10"/>
-          </p:nvPr>
-        </p:nvSpPr>
-        <p:spPr/>
-        <p:txBody>
-          <a:bodyPr/>
-          <a:lstStyle/>
-          <a:p>
-            <a:fld id="{2C5A4276-9034-4F68-8B2D-8D580C8476C4}" type="datetimeFigureOut">
-              <a:rPr lang="en-US" smtClean="0"/>
-              <a:t>10/14/2025</a:t>
-            </a:fld>
-            <a:endParaRPr lang="en-US"/>
-          </a:p>
-        </p:txBody>
-      </p:sp>
-      <p:sp>
-        <p:nvSpPr>
-          <p:cNvPr id="6" name="Footer Placeholder 5"/>
-          <p:cNvSpPr>
-            <a:spLocks noGrp="1"/>
-          </p:cNvSpPr>
-          <p:nvPr>
-            <p:ph type="ftr" sz="quarter" idx="11"/>
-          </p:nvPr>
-        </p:nvSpPr>
-        <p:spPr/>
-        <p:txBody>
-          <a:bodyPr/>
-          <a:lstStyle/>
-          <a:p>
-            <a:endParaRPr lang="en-US"/>
-          </a:p>
-        </p:txBody>
-      </p:sp>
-      <p:sp>
-        <p:nvSpPr>
-          <p:cNvPr id="7" name="Slide Number Placeholder 6"/>
-          <p:cNvSpPr>
-            <a:spLocks noGrp="1"/>
-          </p:cNvSpPr>
-          <p:nvPr>
-            <p:ph type="sldNum" sz="quarter" idx="12"/>
-          </p:nvPr>
-        </p:nvSpPr>
-        <p:spPr/>
-        <p:txBody>
-          <a:bodyPr/>
-          <a:lstStyle/>
-          <a:p>
-            <a:fld id="{51F9AB11-5268-4777-85B6-D98FC480BF1C}" type="slidenum">
-              <a:rPr lang="en-US" smtClean="0"/>
-              <a:t>‹#›</a:t>
-            </a:fld>
-            <a:endParaRPr lang="en-US"/>
-          </a:p>
-        </p:txBody>
-      </p:sp>
-    </p:spTree>
-    <p:extLst>
-      <p:ext uri="{BB962C8B-B14F-4D97-AF65-F5344CB8AC3E}">
-        <p14:creationId xmlns:p14="http://schemas.microsoft.com/office/powerpoint/2010/main" val="1651376254"/>
       </p:ext>
     </p:extLst>
   </p:cSld>
@@ -3113,6 +3552,13 @@
             <a:schemeClr val="lt1"/>
           </a:fontRef>
         </p:style>
+        <p:txBody>
+          <a:bodyPr/>
+          <a:lstStyle/>
+          <a:p>
+            <a:endParaRPr lang="en-US"/>
+          </a:p>
+        </p:txBody>
       </p:sp>
       <p:sp>
         <p:nvSpPr>
@@ -3151,6 +3597,13 @@
             <a:schemeClr val="lt1"/>
           </a:fontRef>
         </p:style>
+        <p:txBody>
+          <a:bodyPr/>
+          <a:lstStyle/>
+          <a:p>
+            <a:endParaRPr lang="en-US"/>
+          </a:p>
+        </p:txBody>
       </p:sp>
       <p:sp>
         <p:nvSpPr>
@@ -3212,38 +3665,37 @@
           <a:p>
             <a:pPr lvl="0"/>
             <a:r>
-              <a:rPr lang="en-US"/>
+              <a:rPr lang="en-US" dirty="0"/>
               <a:t>Click to edit Master text styles</a:t>
             </a:r>
           </a:p>
           <a:p>
             <a:pPr lvl="1"/>
             <a:r>
-              <a:rPr lang="en-US"/>
+              <a:rPr lang="en-US" dirty="0"/>
               <a:t>Second level</a:t>
             </a:r>
           </a:p>
           <a:p>
             <a:pPr lvl="2"/>
             <a:r>
-              <a:rPr lang="en-US"/>
+              <a:rPr lang="en-US" dirty="0"/>
               <a:t>Third level</a:t>
             </a:r>
           </a:p>
           <a:p>
             <a:pPr lvl="3"/>
             <a:r>
-              <a:rPr lang="en-US"/>
+              <a:rPr lang="en-US" dirty="0"/>
               <a:t>Fourth level</a:t>
             </a:r>
           </a:p>
           <a:p>
             <a:pPr lvl="4"/>
             <a:r>
-              <a:rPr lang="en-US"/>
+              <a:rPr lang="en-US" dirty="0"/>
               <a:t>Fifth level</a:t>
             </a:r>
-            <a:endParaRPr lang="en-US" dirty="0"/>
           </a:p>
         </p:txBody>
       </p:sp>
@@ -3280,7 +3732,7 @@
           <a:p>
             <a:fld id="{2C5A4276-9034-4F68-8B2D-8D580C8476C4}" type="datetimeFigureOut">
               <a:rPr lang="en-US" smtClean="0"/>
-              <a:t>10/14/2025</a:t>
+              <a:t>10/16/2025</a:t>
             </a:fld>
             <a:endParaRPr lang="en-US"/>
           </a:p>
@@ -3407,17 +3859,18 @@
   </p:cSld>
   <p:clrMap bg1="lt1" tx1="dk1" bg2="lt2" tx2="dk2" accent1="accent1" accent2="accent2" accent3="accent3" accent4="accent4" accent5="accent5" accent6="accent6" hlink="hlink" folHlink="folHlink"/>
   <p:sldLayoutIdLst>
-    <p:sldLayoutId id="2147483661" r:id="rId1"/>
-    <p:sldLayoutId id="2147483662" r:id="rId2"/>
-    <p:sldLayoutId id="2147483663" r:id="rId3"/>
-    <p:sldLayoutId id="2147483664" r:id="rId4"/>
-    <p:sldLayoutId id="2147483665" r:id="rId5"/>
-    <p:sldLayoutId id="2147483666" r:id="rId6"/>
-    <p:sldLayoutId id="2147483667" r:id="rId7"/>
-    <p:sldLayoutId id="2147483668" r:id="rId8"/>
-    <p:sldLayoutId id="2147483669" r:id="rId9"/>
-    <p:sldLayoutId id="2147483670" r:id="rId10"/>
-    <p:sldLayoutId id="2147483671" r:id="rId11"/>
+    <p:sldLayoutId id="2147483662" r:id="rId1"/>
+    <p:sldLayoutId id="2147483672" r:id="rId2"/>
+    <p:sldLayoutId id="2147483661" r:id="rId3"/>
+    <p:sldLayoutId id="2147483663" r:id="rId4"/>
+    <p:sldLayoutId id="2147483664" r:id="rId5"/>
+    <p:sldLayoutId id="2147483665" r:id="rId6"/>
+    <p:sldLayoutId id="2147483666" r:id="rId7"/>
+    <p:sldLayoutId id="2147483667" r:id="rId8"/>
+    <p:sldLayoutId id="2147483668" r:id="rId9"/>
+    <p:sldLayoutId id="2147483669" r:id="rId10"/>
+    <p:sldLayoutId id="2147483670" r:id="rId11"/>
+    <p:sldLayoutId id="2147483671" r:id="rId12"/>
   </p:sldLayoutIdLst>
   <p:txStyles>
     <p:titleStyle>

</xml_diff>

<commit_message>
Add demo file structure. Add /gifs directory in assets. Add images for working with file structure and generating R Projects. Add file structure content and conceptual intro to `R_importing-data.Rmd`.
</commit_message>
<xml_diff>
--- a/assets/powerpoint-styles/light-theme.pptx
+++ b/assets/powerpoint-styles/light-theme.pptx
@@ -344,8 +344,8 @@
 </file>
 
 <file path=ppt/slideLayouts/slideLayout10.xml><?xml version="1.0" encoding="utf-8"?>
-<p:sldLayout xmlns:a="http://schemas.openxmlformats.org/drawingml/2006/main" xmlns:r="http://schemas.openxmlformats.org/officeDocument/2006/relationships" xmlns:p="http://schemas.openxmlformats.org/presentationml/2006/main" showMasterSp="0" type="picTx" preserve="1">
-  <p:cSld name="Picture with Caption">
+<p:sldLayout xmlns:a="http://schemas.openxmlformats.org/drawingml/2006/main" xmlns:r="http://schemas.openxmlformats.org/officeDocument/2006/relationships" xmlns:p="http://schemas.openxmlformats.org/presentationml/2006/main" type="vertTx" preserve="1">
+  <p:cSld name="Title and Vertical Text">
     <p:spTree>
       <p:nvGrpSpPr>
         <p:cNvPr id="1" name=""/>
@@ -362,14 +362,184 @@
       </p:grpSpPr>
       <p:sp>
         <p:nvSpPr>
-          <p:cNvPr id="8" name="Rectangle 7"/>
+          <p:cNvPr id="2" name="Title 1"/>
+          <p:cNvSpPr>
+            <a:spLocks noGrp="1"/>
+          </p:cNvSpPr>
+          <p:nvPr>
+            <p:ph type="title"/>
+          </p:nvPr>
+        </p:nvSpPr>
+        <p:spPr/>
+        <p:txBody>
+          <a:bodyPr/>
+          <a:lstStyle/>
+          <a:p>
+            <a:r>
+              <a:rPr lang="en-US"/>
+              <a:t>Click to edit Master title style</a:t>
+            </a:r>
+            <a:endParaRPr lang="en-US" dirty="0"/>
+          </a:p>
+        </p:txBody>
+      </p:sp>
+      <p:sp>
+        <p:nvSpPr>
+          <p:cNvPr id="3" name="Vertical Text Placeholder 2"/>
+          <p:cNvSpPr>
+            <a:spLocks noGrp="1"/>
+          </p:cNvSpPr>
+          <p:nvPr>
+            <p:ph type="body" orient="vert" idx="1"/>
+          </p:nvPr>
+        </p:nvSpPr>
+        <p:spPr/>
+        <p:txBody>
+          <a:bodyPr vert="eaVert" lIns="45720" tIns="0" rIns="45720" bIns="0"/>
+          <a:lstStyle/>
+          <a:p>
+            <a:pPr lvl="0"/>
+            <a:r>
+              <a:rPr lang="en-US"/>
+              <a:t>Click to edit Master text styles</a:t>
+            </a:r>
+          </a:p>
+          <a:p>
+            <a:pPr lvl="1"/>
+            <a:r>
+              <a:rPr lang="en-US"/>
+              <a:t>Second level</a:t>
+            </a:r>
+          </a:p>
+          <a:p>
+            <a:pPr lvl="2"/>
+            <a:r>
+              <a:rPr lang="en-US"/>
+              <a:t>Third level</a:t>
+            </a:r>
+          </a:p>
+          <a:p>
+            <a:pPr lvl="3"/>
+            <a:r>
+              <a:rPr lang="en-US"/>
+              <a:t>Fourth level</a:t>
+            </a:r>
+          </a:p>
+          <a:p>
+            <a:pPr lvl="4"/>
+            <a:r>
+              <a:rPr lang="en-US"/>
+              <a:t>Fifth level</a:t>
+            </a:r>
+            <a:endParaRPr lang="en-US" dirty="0"/>
+          </a:p>
+        </p:txBody>
+      </p:sp>
+      <p:sp>
+        <p:nvSpPr>
+          <p:cNvPr id="4" name="Date Placeholder 3"/>
+          <p:cNvSpPr>
+            <a:spLocks noGrp="1"/>
+          </p:cNvSpPr>
+          <p:nvPr>
+            <p:ph type="dt" sz="half" idx="10"/>
+          </p:nvPr>
+        </p:nvSpPr>
+        <p:spPr/>
+        <p:txBody>
+          <a:bodyPr/>
+          <a:lstStyle/>
+          <a:p>
+            <a:fld id="{2C5A4276-9034-4F68-8B2D-8D580C8476C4}" type="datetimeFigureOut">
+              <a:rPr lang="en-US" smtClean="0"/>
+              <a:t>10/16/2025</a:t>
+            </a:fld>
+            <a:endParaRPr lang="en-US"/>
+          </a:p>
+        </p:txBody>
+      </p:sp>
+      <p:sp>
+        <p:nvSpPr>
+          <p:cNvPr id="5" name="Footer Placeholder 4"/>
+          <p:cNvSpPr>
+            <a:spLocks noGrp="1"/>
+          </p:cNvSpPr>
+          <p:nvPr>
+            <p:ph type="ftr" sz="quarter" idx="11"/>
+          </p:nvPr>
+        </p:nvSpPr>
+        <p:spPr/>
+        <p:txBody>
+          <a:bodyPr/>
+          <a:lstStyle/>
+          <a:p>
+            <a:endParaRPr lang="en-US"/>
+          </a:p>
+        </p:txBody>
+      </p:sp>
+      <p:sp>
+        <p:nvSpPr>
+          <p:cNvPr id="6" name="Slide Number Placeholder 5"/>
+          <p:cNvSpPr>
+            <a:spLocks noGrp="1"/>
+          </p:cNvSpPr>
+          <p:nvPr>
+            <p:ph type="sldNum" sz="quarter" idx="12"/>
+          </p:nvPr>
+        </p:nvSpPr>
+        <p:spPr/>
+        <p:txBody>
+          <a:bodyPr/>
+          <a:lstStyle/>
+          <a:p>
+            <a:fld id="{51F9AB11-5268-4777-85B6-D98FC480BF1C}" type="slidenum">
+              <a:rPr lang="en-US" smtClean="0"/>
+              <a:t>‹#›</a:t>
+            </a:fld>
+            <a:endParaRPr lang="en-US"/>
+          </a:p>
+        </p:txBody>
+      </p:sp>
+    </p:spTree>
+    <p:extLst>
+      <p:ext uri="{BB962C8B-B14F-4D97-AF65-F5344CB8AC3E}">
+        <p14:creationId xmlns:p14="http://schemas.microsoft.com/office/powerpoint/2010/main" val="2955095806"/>
+      </p:ext>
+    </p:extLst>
+  </p:cSld>
+  <p:clrMapOvr>
+    <a:masterClrMapping/>
+  </p:clrMapOvr>
+</p:sldLayout>
+</file>
+
+<file path=ppt/slideLayouts/slideLayout11.xml><?xml version="1.0" encoding="utf-8"?>
+<p:sldLayout xmlns:a="http://schemas.openxmlformats.org/drawingml/2006/main" xmlns:r="http://schemas.openxmlformats.org/officeDocument/2006/relationships" xmlns:p="http://schemas.openxmlformats.org/presentationml/2006/main" showMasterSp="0" type="vertTitleAndTx" preserve="1">
+  <p:cSld name="Vertical Title and Text">
+    <p:spTree>
+      <p:nvGrpSpPr>
+        <p:cNvPr id="1" name=""/>
+        <p:cNvGrpSpPr/>
+        <p:nvPr/>
+      </p:nvGrpSpPr>
+      <p:grpSpPr>
+        <a:xfrm>
+          <a:off x="0" y="0"/>
+          <a:ext cx="0" cy="0"/>
+          <a:chOff x="0" y="0"/>
+          <a:chExt cx="0" cy="0"/>
+        </a:xfrm>
+      </p:grpSpPr>
+      <p:sp>
+        <p:nvSpPr>
+          <p:cNvPr id="7" name="Rectangle 6"/>
           <p:cNvSpPr/>
           <p:nvPr/>
         </p:nvSpPr>
         <p:spPr>
           <a:xfrm>
-            <a:off x="0" y="4953000"/>
-            <a:ext cx="12188825" cy="1905000"/>
+            <a:off x="3175" y="6400800"/>
+            <a:ext cx="12188825" cy="457200"/>
           </a:xfrm>
           <a:prstGeom prst="rect">
             <a:avLst/>
@@ -400,13 +570,13 @@
       </p:sp>
       <p:sp>
         <p:nvSpPr>
-          <p:cNvPr id="9" name="Rectangle 8"/>
+          <p:cNvPr id="8" name="Rectangle 7"/>
           <p:cNvSpPr/>
           <p:nvPr/>
         </p:nvSpPr>
         <p:spPr>
           <a:xfrm>
-            <a:off x="15" y="4915076"/>
+            <a:off x="15" y="6334316"/>
             <a:ext cx="12188825" cy="64008"/>
           </a:xfrm>
           <a:prstGeom prst="rect">
@@ -438,537 +608,6 @@
       </p:sp>
       <p:sp>
         <p:nvSpPr>
-          <p:cNvPr id="2" name="Title 1"/>
-          <p:cNvSpPr>
-            <a:spLocks noGrp="1"/>
-          </p:cNvSpPr>
-          <p:nvPr>
-            <p:ph type="title"/>
-          </p:nvPr>
-        </p:nvSpPr>
-        <p:spPr>
-          <a:xfrm>
-            <a:off x="1097280" y="5074920"/>
-            <a:ext cx="10113264" cy="822960"/>
-          </a:xfrm>
-        </p:spPr>
-        <p:txBody>
-          <a:bodyPr lIns="91440" tIns="0" rIns="91440" bIns="0" anchor="b">
-            <a:noAutofit/>
-          </a:bodyPr>
-          <a:lstStyle>
-            <a:lvl1pPr>
-              <a:defRPr sz="3600" b="0">
-                <a:solidFill>
-                  <a:srgbClr val="FFFFFF"/>
-                </a:solidFill>
-              </a:defRPr>
-            </a:lvl1pPr>
-          </a:lstStyle>
-          <a:p>
-            <a:r>
-              <a:rPr lang="en-US"/>
-              <a:t>Click to edit Master title style</a:t>
-            </a:r>
-            <a:endParaRPr lang="en-US" dirty="0"/>
-          </a:p>
-        </p:txBody>
-      </p:sp>
-      <p:sp>
-        <p:nvSpPr>
-          <p:cNvPr id="3" name="Picture Placeholder 2"/>
-          <p:cNvSpPr>
-            <a:spLocks noGrp="1" noChangeAspect="1"/>
-          </p:cNvSpPr>
-          <p:nvPr>
-            <p:ph type="pic" idx="1"/>
-          </p:nvPr>
-        </p:nvSpPr>
-        <p:spPr>
-          <a:xfrm>
-            <a:off x="15" y="0"/>
-            <a:ext cx="12191985" cy="4915076"/>
-          </a:xfrm>
-          <a:blipFill>
-            <a:blip r:embed="rId2"/>
-            <a:stretch>
-              <a:fillRect/>
-            </a:stretch>
-          </a:blipFill>
-        </p:spPr>
-        <p:txBody>
-          <a:bodyPr lIns="457200" tIns="457200" anchor="t"/>
-          <a:lstStyle>
-            <a:lvl1pPr marL="0" indent="0">
-              <a:buNone/>
-              <a:defRPr sz="3200">
-                <a:solidFill>
-                  <a:schemeClr val="bg1"/>
-                </a:solidFill>
-              </a:defRPr>
-            </a:lvl1pPr>
-            <a:lvl2pPr marL="457200" indent="0">
-              <a:buNone/>
-              <a:defRPr sz="2800"/>
-            </a:lvl2pPr>
-            <a:lvl3pPr marL="914400" indent="0">
-              <a:buNone/>
-              <a:defRPr sz="2400"/>
-            </a:lvl3pPr>
-            <a:lvl4pPr marL="1371600" indent="0">
-              <a:buNone/>
-              <a:defRPr sz="2000"/>
-            </a:lvl4pPr>
-            <a:lvl5pPr marL="1828800" indent="0">
-              <a:buNone/>
-              <a:defRPr sz="2000"/>
-            </a:lvl5pPr>
-            <a:lvl6pPr marL="2286000" indent="0">
-              <a:buNone/>
-              <a:defRPr sz="2000"/>
-            </a:lvl6pPr>
-            <a:lvl7pPr marL="2743200" indent="0">
-              <a:buNone/>
-              <a:defRPr sz="2000"/>
-            </a:lvl7pPr>
-            <a:lvl8pPr marL="3200400" indent="0">
-              <a:buNone/>
-              <a:defRPr sz="2000"/>
-            </a:lvl8pPr>
-            <a:lvl9pPr marL="3657600" indent="0">
-              <a:buNone/>
-              <a:defRPr sz="2000"/>
-            </a:lvl9pPr>
-          </a:lstStyle>
-          <a:p>
-            <a:r>
-              <a:rPr lang="en-US"/>
-              <a:t>Click icon to add picture</a:t>
-            </a:r>
-            <a:endParaRPr lang="en-US" dirty="0"/>
-          </a:p>
-        </p:txBody>
-      </p:sp>
-      <p:sp>
-        <p:nvSpPr>
-          <p:cNvPr id="4" name="Text Placeholder 3"/>
-          <p:cNvSpPr>
-            <a:spLocks noGrp="1"/>
-          </p:cNvSpPr>
-          <p:nvPr>
-            <p:ph type="body" sz="half" idx="2"/>
-          </p:nvPr>
-        </p:nvSpPr>
-        <p:spPr>
-          <a:xfrm>
-            <a:off x="1097280" y="5907023"/>
-            <a:ext cx="10113264" cy="594360"/>
-          </a:xfrm>
-        </p:spPr>
-        <p:txBody>
-          <a:bodyPr lIns="91440" tIns="0" rIns="91440" bIns="0">
-            <a:normAutofit/>
-          </a:bodyPr>
-          <a:lstStyle>
-            <a:lvl1pPr marL="0" indent="0">
-              <a:spcBef>
-                <a:spcPts val="0"/>
-              </a:spcBef>
-              <a:spcAft>
-                <a:spcPts val="600"/>
-              </a:spcAft>
-              <a:buNone/>
-              <a:defRPr sz="1500">
-                <a:solidFill>
-                  <a:srgbClr val="FFFFFF"/>
-                </a:solidFill>
-              </a:defRPr>
-            </a:lvl1pPr>
-            <a:lvl2pPr marL="457200" indent="0">
-              <a:buNone/>
-              <a:defRPr sz="1200"/>
-            </a:lvl2pPr>
-            <a:lvl3pPr marL="914400" indent="0">
-              <a:buNone/>
-              <a:defRPr sz="1000"/>
-            </a:lvl3pPr>
-            <a:lvl4pPr marL="1371600" indent="0">
-              <a:buNone/>
-              <a:defRPr sz="900"/>
-            </a:lvl4pPr>
-            <a:lvl5pPr marL="1828800" indent="0">
-              <a:buNone/>
-              <a:defRPr sz="900"/>
-            </a:lvl5pPr>
-            <a:lvl6pPr marL="2286000" indent="0">
-              <a:buNone/>
-              <a:defRPr sz="900"/>
-            </a:lvl6pPr>
-            <a:lvl7pPr marL="2743200" indent="0">
-              <a:buNone/>
-              <a:defRPr sz="900"/>
-            </a:lvl7pPr>
-            <a:lvl8pPr marL="3200400" indent="0">
-              <a:buNone/>
-              <a:defRPr sz="900"/>
-            </a:lvl8pPr>
-            <a:lvl9pPr marL="3657600" indent="0">
-              <a:buNone/>
-              <a:defRPr sz="900"/>
-            </a:lvl9pPr>
-          </a:lstStyle>
-          <a:p>
-            <a:pPr lvl="0"/>
-            <a:r>
-              <a:rPr lang="en-US"/>
-              <a:t>Click to edit Master text styles</a:t>
-            </a:r>
-          </a:p>
-        </p:txBody>
-      </p:sp>
-      <p:sp>
-        <p:nvSpPr>
-          <p:cNvPr id="5" name="Date Placeholder 4"/>
-          <p:cNvSpPr>
-            <a:spLocks noGrp="1"/>
-          </p:cNvSpPr>
-          <p:nvPr>
-            <p:ph type="dt" sz="half" idx="10"/>
-          </p:nvPr>
-        </p:nvSpPr>
-        <p:spPr/>
-        <p:txBody>
-          <a:bodyPr/>
-          <a:lstStyle/>
-          <a:p>
-            <a:fld id="{2C5A4276-9034-4F68-8B2D-8D580C8476C4}" type="datetimeFigureOut">
-              <a:rPr lang="en-US" smtClean="0"/>
-              <a:t>10/16/2025</a:t>
-            </a:fld>
-            <a:endParaRPr lang="en-US"/>
-          </a:p>
-        </p:txBody>
-      </p:sp>
-      <p:sp>
-        <p:nvSpPr>
-          <p:cNvPr id="6" name="Footer Placeholder 5"/>
-          <p:cNvSpPr>
-            <a:spLocks noGrp="1"/>
-          </p:cNvSpPr>
-          <p:nvPr>
-            <p:ph type="ftr" sz="quarter" idx="11"/>
-          </p:nvPr>
-        </p:nvSpPr>
-        <p:spPr/>
-        <p:txBody>
-          <a:bodyPr/>
-          <a:lstStyle/>
-          <a:p>
-            <a:endParaRPr lang="en-US"/>
-          </a:p>
-        </p:txBody>
-      </p:sp>
-      <p:sp>
-        <p:nvSpPr>
-          <p:cNvPr id="7" name="Slide Number Placeholder 6"/>
-          <p:cNvSpPr>
-            <a:spLocks noGrp="1"/>
-          </p:cNvSpPr>
-          <p:nvPr>
-            <p:ph type="sldNum" sz="quarter" idx="12"/>
-          </p:nvPr>
-        </p:nvSpPr>
-        <p:spPr/>
-        <p:txBody>
-          <a:bodyPr/>
-          <a:lstStyle/>
-          <a:p>
-            <a:fld id="{51F9AB11-5268-4777-85B6-D98FC480BF1C}" type="slidenum">
-              <a:rPr lang="en-US" smtClean="0"/>
-              <a:t>‹#›</a:t>
-            </a:fld>
-            <a:endParaRPr lang="en-US"/>
-          </a:p>
-        </p:txBody>
-      </p:sp>
-    </p:spTree>
-    <p:extLst>
-      <p:ext uri="{BB962C8B-B14F-4D97-AF65-F5344CB8AC3E}">
-        <p14:creationId xmlns:p14="http://schemas.microsoft.com/office/powerpoint/2010/main" val="1651376254"/>
-      </p:ext>
-    </p:extLst>
-  </p:cSld>
-  <p:clrMapOvr>
-    <a:masterClrMapping/>
-  </p:clrMapOvr>
-</p:sldLayout>
-</file>
-
-<file path=ppt/slideLayouts/slideLayout11.xml><?xml version="1.0" encoding="utf-8"?>
-<p:sldLayout xmlns:a="http://schemas.openxmlformats.org/drawingml/2006/main" xmlns:r="http://schemas.openxmlformats.org/officeDocument/2006/relationships" xmlns:p="http://schemas.openxmlformats.org/presentationml/2006/main" type="vertTx" preserve="1">
-  <p:cSld name="Title and Vertical Text">
-    <p:spTree>
-      <p:nvGrpSpPr>
-        <p:cNvPr id="1" name=""/>
-        <p:cNvGrpSpPr/>
-        <p:nvPr/>
-      </p:nvGrpSpPr>
-      <p:grpSpPr>
-        <a:xfrm>
-          <a:off x="0" y="0"/>
-          <a:ext cx="0" cy="0"/>
-          <a:chOff x="0" y="0"/>
-          <a:chExt cx="0" cy="0"/>
-        </a:xfrm>
-      </p:grpSpPr>
-      <p:sp>
-        <p:nvSpPr>
-          <p:cNvPr id="2" name="Title 1"/>
-          <p:cNvSpPr>
-            <a:spLocks noGrp="1"/>
-          </p:cNvSpPr>
-          <p:nvPr>
-            <p:ph type="title"/>
-          </p:nvPr>
-        </p:nvSpPr>
-        <p:spPr/>
-        <p:txBody>
-          <a:bodyPr/>
-          <a:lstStyle/>
-          <a:p>
-            <a:r>
-              <a:rPr lang="en-US"/>
-              <a:t>Click to edit Master title style</a:t>
-            </a:r>
-            <a:endParaRPr lang="en-US" dirty="0"/>
-          </a:p>
-        </p:txBody>
-      </p:sp>
-      <p:sp>
-        <p:nvSpPr>
-          <p:cNvPr id="3" name="Vertical Text Placeholder 2"/>
-          <p:cNvSpPr>
-            <a:spLocks noGrp="1"/>
-          </p:cNvSpPr>
-          <p:nvPr>
-            <p:ph type="body" orient="vert" idx="1"/>
-          </p:nvPr>
-        </p:nvSpPr>
-        <p:spPr/>
-        <p:txBody>
-          <a:bodyPr vert="eaVert" lIns="45720" tIns="0" rIns="45720" bIns="0"/>
-          <a:lstStyle/>
-          <a:p>
-            <a:pPr lvl="0"/>
-            <a:r>
-              <a:rPr lang="en-US"/>
-              <a:t>Click to edit Master text styles</a:t>
-            </a:r>
-          </a:p>
-          <a:p>
-            <a:pPr lvl="1"/>
-            <a:r>
-              <a:rPr lang="en-US"/>
-              <a:t>Second level</a:t>
-            </a:r>
-          </a:p>
-          <a:p>
-            <a:pPr lvl="2"/>
-            <a:r>
-              <a:rPr lang="en-US"/>
-              <a:t>Third level</a:t>
-            </a:r>
-          </a:p>
-          <a:p>
-            <a:pPr lvl="3"/>
-            <a:r>
-              <a:rPr lang="en-US"/>
-              <a:t>Fourth level</a:t>
-            </a:r>
-          </a:p>
-          <a:p>
-            <a:pPr lvl="4"/>
-            <a:r>
-              <a:rPr lang="en-US"/>
-              <a:t>Fifth level</a:t>
-            </a:r>
-            <a:endParaRPr lang="en-US" dirty="0"/>
-          </a:p>
-        </p:txBody>
-      </p:sp>
-      <p:sp>
-        <p:nvSpPr>
-          <p:cNvPr id="4" name="Date Placeholder 3"/>
-          <p:cNvSpPr>
-            <a:spLocks noGrp="1"/>
-          </p:cNvSpPr>
-          <p:nvPr>
-            <p:ph type="dt" sz="half" idx="10"/>
-          </p:nvPr>
-        </p:nvSpPr>
-        <p:spPr/>
-        <p:txBody>
-          <a:bodyPr/>
-          <a:lstStyle/>
-          <a:p>
-            <a:fld id="{2C5A4276-9034-4F68-8B2D-8D580C8476C4}" type="datetimeFigureOut">
-              <a:rPr lang="en-US" smtClean="0"/>
-              <a:t>10/16/2025</a:t>
-            </a:fld>
-            <a:endParaRPr lang="en-US"/>
-          </a:p>
-        </p:txBody>
-      </p:sp>
-      <p:sp>
-        <p:nvSpPr>
-          <p:cNvPr id="5" name="Footer Placeholder 4"/>
-          <p:cNvSpPr>
-            <a:spLocks noGrp="1"/>
-          </p:cNvSpPr>
-          <p:nvPr>
-            <p:ph type="ftr" sz="quarter" idx="11"/>
-          </p:nvPr>
-        </p:nvSpPr>
-        <p:spPr/>
-        <p:txBody>
-          <a:bodyPr/>
-          <a:lstStyle/>
-          <a:p>
-            <a:endParaRPr lang="en-US"/>
-          </a:p>
-        </p:txBody>
-      </p:sp>
-      <p:sp>
-        <p:nvSpPr>
-          <p:cNvPr id="6" name="Slide Number Placeholder 5"/>
-          <p:cNvSpPr>
-            <a:spLocks noGrp="1"/>
-          </p:cNvSpPr>
-          <p:nvPr>
-            <p:ph type="sldNum" sz="quarter" idx="12"/>
-          </p:nvPr>
-        </p:nvSpPr>
-        <p:spPr/>
-        <p:txBody>
-          <a:bodyPr/>
-          <a:lstStyle/>
-          <a:p>
-            <a:fld id="{51F9AB11-5268-4777-85B6-D98FC480BF1C}" type="slidenum">
-              <a:rPr lang="en-US" smtClean="0"/>
-              <a:t>‹#›</a:t>
-            </a:fld>
-            <a:endParaRPr lang="en-US"/>
-          </a:p>
-        </p:txBody>
-      </p:sp>
-    </p:spTree>
-    <p:extLst>
-      <p:ext uri="{BB962C8B-B14F-4D97-AF65-F5344CB8AC3E}">
-        <p14:creationId xmlns:p14="http://schemas.microsoft.com/office/powerpoint/2010/main" val="2955095806"/>
-      </p:ext>
-    </p:extLst>
-  </p:cSld>
-  <p:clrMapOvr>
-    <a:masterClrMapping/>
-  </p:clrMapOvr>
-</p:sldLayout>
-</file>
-
-<file path=ppt/slideLayouts/slideLayout12.xml><?xml version="1.0" encoding="utf-8"?>
-<p:sldLayout xmlns:a="http://schemas.openxmlformats.org/drawingml/2006/main" xmlns:r="http://schemas.openxmlformats.org/officeDocument/2006/relationships" xmlns:p="http://schemas.openxmlformats.org/presentationml/2006/main" showMasterSp="0" type="vertTitleAndTx" preserve="1">
-  <p:cSld name="Vertical Title and Text">
-    <p:spTree>
-      <p:nvGrpSpPr>
-        <p:cNvPr id="1" name=""/>
-        <p:cNvGrpSpPr/>
-        <p:nvPr/>
-      </p:nvGrpSpPr>
-      <p:grpSpPr>
-        <a:xfrm>
-          <a:off x="0" y="0"/>
-          <a:ext cx="0" cy="0"/>
-          <a:chOff x="0" y="0"/>
-          <a:chExt cx="0" cy="0"/>
-        </a:xfrm>
-      </p:grpSpPr>
-      <p:sp>
-        <p:nvSpPr>
-          <p:cNvPr id="7" name="Rectangle 6"/>
-          <p:cNvSpPr/>
-          <p:nvPr/>
-        </p:nvSpPr>
-        <p:spPr>
-          <a:xfrm>
-            <a:off x="3175" y="6400800"/>
-            <a:ext cx="12188825" cy="457200"/>
-          </a:xfrm>
-          <a:prstGeom prst="rect">
-            <a:avLst/>
-          </a:prstGeom>
-          <a:solidFill>
-            <a:schemeClr val="accent2"/>
-          </a:solidFill>
-          <a:ln>
-            <a:noFill/>
-          </a:ln>
-        </p:spPr>
-        <p:style>
-          <a:lnRef idx="2">
-            <a:schemeClr val="accent1">
-              <a:shade val="50000"/>
-            </a:schemeClr>
-          </a:lnRef>
-          <a:fillRef idx="1">
-            <a:schemeClr val="accent1"/>
-          </a:fillRef>
-          <a:effectRef idx="0">
-            <a:schemeClr val="accent1"/>
-          </a:effectRef>
-          <a:fontRef idx="minor">
-            <a:schemeClr val="lt1"/>
-          </a:fontRef>
-        </p:style>
-      </p:sp>
-      <p:sp>
-        <p:nvSpPr>
-          <p:cNvPr id="8" name="Rectangle 7"/>
-          <p:cNvSpPr/>
-          <p:nvPr/>
-        </p:nvSpPr>
-        <p:spPr>
-          <a:xfrm>
-            <a:off x="15" y="6334316"/>
-            <a:ext cx="12188825" cy="64008"/>
-          </a:xfrm>
-          <a:prstGeom prst="rect">
-            <a:avLst/>
-          </a:prstGeom>
-          <a:solidFill>
-            <a:schemeClr val="accent1"/>
-          </a:solidFill>
-          <a:ln>
-            <a:noFill/>
-          </a:ln>
-        </p:spPr>
-        <p:style>
-          <a:lnRef idx="2">
-            <a:schemeClr val="accent1">
-              <a:shade val="50000"/>
-            </a:schemeClr>
-          </a:lnRef>
-          <a:fillRef idx="1">
-            <a:schemeClr val="accent1"/>
-          </a:fillRef>
-          <a:effectRef idx="0">
-            <a:schemeClr val="accent1"/>
-          </a:effectRef>
-          <a:fontRef idx="minor">
-            <a:schemeClr val="lt1"/>
-          </a:fontRef>
-        </p:style>
-      </p:sp>
-      <p:sp>
-        <p:nvSpPr>
           <p:cNvPr id="2" name="Vertical Title 1"/>
           <p:cNvSpPr>
             <a:spLocks noGrp="1"/>
@@ -1131,307 +770,6 @@
 </file>
 
 <file path=ppt/slideLayouts/slideLayout2.xml><?xml version="1.0" encoding="utf-8"?>
-<p:sldLayout xmlns:a="http://schemas.openxmlformats.org/drawingml/2006/main" xmlns:r="http://schemas.openxmlformats.org/officeDocument/2006/relationships" xmlns:p="http://schemas.openxmlformats.org/presentationml/2006/main" preserve="1" userDrawn="1">
-  <p:cSld name="CodeDark">
-    <p:bg>
-      <p:bgRef idx="1001">
-        <a:schemeClr val="bg1"/>
-      </p:bgRef>
-    </p:bg>
-    <p:spTree>
-      <p:nvGrpSpPr>
-        <p:cNvPr id="1" name=""/>
-        <p:cNvGrpSpPr/>
-        <p:nvPr/>
-      </p:nvGrpSpPr>
-      <p:grpSpPr>
-        <a:xfrm>
-          <a:off x="0" y="0"/>
-          <a:ext cx="0" cy="0"/>
-          <a:chOff x="0" y="0"/>
-          <a:chExt cx="0" cy="0"/>
-        </a:xfrm>
-      </p:grpSpPr>
-      <p:sp>
-        <p:nvSpPr>
-          <p:cNvPr id="2" name="Title 1"/>
-          <p:cNvSpPr>
-            <a:spLocks noGrp="1"/>
-          </p:cNvSpPr>
-          <p:nvPr>
-            <p:ph type="title"/>
-          </p:nvPr>
-        </p:nvSpPr>
-        <p:spPr/>
-        <p:txBody>
-          <a:bodyPr/>
-          <a:lstStyle>
-            <a:lvl1pPr marL="0">
-              <a:defRPr/>
-            </a:lvl1pPr>
-          </a:lstStyle>
-          <a:p>
-            <a:r>
-              <a:rPr lang="en-US"/>
-              <a:t>Click to edit Master title style</a:t>
-            </a:r>
-            <a:endParaRPr lang="en-US" dirty="0"/>
-          </a:p>
-        </p:txBody>
-      </p:sp>
-      <p:sp>
-        <p:nvSpPr>
-          <p:cNvPr id="3" name="Content Placeholder 2"/>
-          <p:cNvSpPr>
-            <a:spLocks noGrp="1"/>
-          </p:cNvSpPr>
-          <p:nvPr>
-            <p:ph idx="1"/>
-          </p:nvPr>
-        </p:nvSpPr>
-        <p:spPr/>
-        <p:txBody>
-          <a:bodyPr/>
-          <a:lstStyle/>
-          <a:p>
-            <a:pPr lvl="0"/>
-            <a:r>
-              <a:rPr lang="en-US"/>
-              <a:t>Click to edit Master text styles</a:t>
-            </a:r>
-          </a:p>
-          <a:p>
-            <a:pPr lvl="1"/>
-            <a:r>
-              <a:rPr lang="en-US"/>
-              <a:t>Second level</a:t>
-            </a:r>
-          </a:p>
-          <a:p>
-            <a:pPr lvl="2"/>
-            <a:r>
-              <a:rPr lang="en-US"/>
-              <a:t>Third level</a:t>
-            </a:r>
-          </a:p>
-          <a:p>
-            <a:pPr lvl="3"/>
-            <a:r>
-              <a:rPr lang="en-US"/>
-              <a:t>Fourth level</a:t>
-            </a:r>
-          </a:p>
-          <a:p>
-            <a:pPr lvl="4"/>
-            <a:r>
-              <a:rPr lang="en-US"/>
-              <a:t>Fifth level</a:t>
-            </a:r>
-            <a:endParaRPr lang="en-US" dirty="0"/>
-          </a:p>
-        </p:txBody>
-      </p:sp>
-      <p:sp>
-        <p:nvSpPr>
-          <p:cNvPr id="4" name="Date Placeholder 3"/>
-          <p:cNvSpPr>
-            <a:spLocks noGrp="1"/>
-          </p:cNvSpPr>
-          <p:nvPr>
-            <p:ph type="dt" sz="half" idx="10"/>
-          </p:nvPr>
-        </p:nvSpPr>
-        <p:spPr/>
-        <p:txBody>
-          <a:bodyPr/>
-          <a:lstStyle/>
-          <a:p>
-            <a:fld id="{2C5A4276-9034-4F68-8B2D-8D580C8476C4}" type="datetimeFigureOut">
-              <a:rPr lang="en-US" smtClean="0"/>
-              <a:t>10/16/2025</a:t>
-            </a:fld>
-            <a:endParaRPr lang="en-US"/>
-          </a:p>
-        </p:txBody>
-      </p:sp>
-      <p:sp>
-        <p:nvSpPr>
-          <p:cNvPr id="5" name="Footer Placeholder 4"/>
-          <p:cNvSpPr>
-            <a:spLocks noGrp="1"/>
-          </p:cNvSpPr>
-          <p:nvPr>
-            <p:ph type="ftr" sz="quarter" idx="11"/>
-          </p:nvPr>
-        </p:nvSpPr>
-        <p:spPr/>
-        <p:txBody>
-          <a:bodyPr/>
-          <a:lstStyle/>
-          <a:p>
-            <a:endParaRPr lang="en-US"/>
-          </a:p>
-        </p:txBody>
-      </p:sp>
-      <p:sp>
-        <p:nvSpPr>
-          <p:cNvPr id="6" name="Slide Number Placeholder 5"/>
-          <p:cNvSpPr>
-            <a:spLocks noGrp="1"/>
-          </p:cNvSpPr>
-          <p:nvPr>
-            <p:ph type="sldNum" sz="quarter" idx="12"/>
-          </p:nvPr>
-        </p:nvSpPr>
-        <p:spPr/>
-        <p:txBody>
-          <a:bodyPr/>
-          <a:lstStyle/>
-          <a:p>
-            <a:fld id="{51F9AB11-5268-4777-85B6-D98FC480BF1C}" type="slidenum">
-              <a:rPr lang="en-US" smtClean="0"/>
-              <a:t>‹#›</a:t>
-            </a:fld>
-            <a:endParaRPr lang="en-US"/>
-          </a:p>
-        </p:txBody>
-      </p:sp>
-      <p:sp>
-        <p:nvSpPr>
-          <p:cNvPr id="8" name="Content Placeholder 7">
-            <a:extLst>
-              <a:ext uri="{FF2B5EF4-FFF2-40B4-BE49-F238E27FC236}">
-                <a16:creationId xmlns:a16="http://schemas.microsoft.com/office/drawing/2014/main" id="{EA103B0F-8D17-54FA-FAEC-B3D1C167DD47}"/>
-              </a:ext>
-            </a:extLst>
-          </p:cNvPr>
-          <p:cNvSpPr>
-            <a:spLocks noGrp="1"/>
-          </p:cNvSpPr>
-          <p:nvPr>
-            <p:ph sz="quarter" idx="13"/>
-          </p:nvPr>
-        </p:nvSpPr>
-        <p:spPr/>
-        <p:txBody>
-          <a:bodyPr/>
-          <a:lstStyle/>
-          <a:p>
-            <a:pPr lvl="0"/>
-            <a:r>
-              <a:rPr lang="en-US" dirty="0"/>
-              <a:t>Click to edit Master text styles</a:t>
-            </a:r>
-          </a:p>
-          <a:p>
-            <a:pPr lvl="1"/>
-            <a:r>
-              <a:rPr lang="en-US" dirty="0"/>
-              <a:t>Second level</a:t>
-            </a:r>
-          </a:p>
-          <a:p>
-            <a:pPr lvl="2"/>
-            <a:r>
-              <a:rPr lang="en-US" dirty="0"/>
-              <a:t>Third level</a:t>
-            </a:r>
-          </a:p>
-          <a:p>
-            <a:pPr lvl="3"/>
-            <a:r>
-              <a:rPr lang="en-US" dirty="0"/>
-              <a:t>Fourth level</a:t>
-            </a:r>
-          </a:p>
-          <a:p>
-            <a:pPr lvl="4"/>
-            <a:r>
-              <a:rPr lang="en-US" dirty="0"/>
-              <a:t>Fifth level</a:t>
-            </a:r>
-          </a:p>
-        </p:txBody>
-      </p:sp>
-      <p:sp>
-        <p:nvSpPr>
-          <p:cNvPr id="9" name="Content Placeholder 8">
-            <a:extLst>
-              <a:ext uri="{FF2B5EF4-FFF2-40B4-BE49-F238E27FC236}">
-                <a16:creationId xmlns:a16="http://schemas.microsoft.com/office/drawing/2014/main" id="{184FCCE5-6201-0E94-39E2-228F2623B732}"/>
-              </a:ext>
-            </a:extLst>
-          </p:cNvPr>
-          <p:cNvSpPr>
-            <a:spLocks noGrp="1"/>
-          </p:cNvSpPr>
-          <p:nvPr>
-            <p:ph sz="quarter" idx="14"/>
-          </p:nvPr>
-        </p:nvSpPr>
-        <p:spPr>
-          <a:xfrm>
-            <a:off x="1096963" y="1846263"/>
-            <a:ext cx="10115550" cy="4022725"/>
-          </a:xfrm>
-          <a:solidFill>
-            <a:schemeClr val="bg1"/>
-          </a:solidFill>
-        </p:spPr>
-        <p:txBody>
-          <a:bodyPr/>
-          <a:lstStyle/>
-          <a:p>
-            <a:pPr lvl="0"/>
-            <a:r>
-              <a:rPr lang="en-US"/>
-              <a:t>Click to edit Master text styles</a:t>
-            </a:r>
-          </a:p>
-          <a:p>
-            <a:pPr lvl="1"/>
-            <a:r>
-              <a:rPr lang="en-US"/>
-              <a:t>Second level</a:t>
-            </a:r>
-          </a:p>
-          <a:p>
-            <a:pPr lvl="2"/>
-            <a:r>
-              <a:rPr lang="en-US"/>
-              <a:t>Third level</a:t>
-            </a:r>
-          </a:p>
-          <a:p>
-            <a:pPr lvl="3"/>
-            <a:r>
-              <a:rPr lang="en-US"/>
-              <a:t>Fourth level</a:t>
-            </a:r>
-          </a:p>
-          <a:p>
-            <a:pPr lvl="4"/>
-            <a:r>
-              <a:rPr lang="en-US"/>
-              <a:t>Fifth level</a:t>
-            </a:r>
-          </a:p>
-        </p:txBody>
-      </p:sp>
-    </p:spTree>
-    <p:extLst>
-      <p:ext uri="{BB962C8B-B14F-4D97-AF65-F5344CB8AC3E}">
-        <p14:creationId xmlns:p14="http://schemas.microsoft.com/office/powerpoint/2010/main" val="3357777262"/>
-      </p:ext>
-    </p:extLst>
-  </p:cSld>
-  <p:clrMapOvr>
-    <a:overrideClrMapping bg1="dk1" tx1="lt1" bg2="dk2" tx2="lt2" accent1="accent1" accent2="accent2" accent3="accent3" accent4="accent4" accent5="accent5" accent6="accent6" hlink="hlink" folHlink="folHlink"/>
-  </p:clrMapOvr>
-</p:sldLayout>
-</file>
-
-<file path=ppt/slideLayouts/slideLayout3.xml><?xml version="1.0" encoding="utf-8"?>
 <p:sldLayout xmlns:a="http://schemas.openxmlformats.org/drawingml/2006/main" xmlns:r="http://schemas.openxmlformats.org/officeDocument/2006/relationships" xmlns:p="http://schemas.openxmlformats.org/presentationml/2006/main" showMasterSp="0" preserve="1" userDrawn="1">
   <p:cSld name="Title Slide">
     <p:spTree>
@@ -1832,7 +1170,7 @@
 </p:sldLayout>
 </file>
 
-<file path=ppt/slideLayouts/slideLayout4.xml><?xml version="1.0" encoding="utf-8"?>
+<file path=ppt/slideLayouts/slideLayout3.xml><?xml version="1.0" encoding="utf-8"?>
 <p:sldLayout xmlns:a="http://schemas.openxmlformats.org/drawingml/2006/main" xmlns:r="http://schemas.openxmlformats.org/officeDocument/2006/relationships" xmlns:p="http://schemas.openxmlformats.org/presentationml/2006/main" showMasterSp="0" type="secHead" preserve="1">
   <p:cSld name="Section Header">
     <p:bg>
@@ -2213,7 +1551,7 @@
 </p:sldLayout>
 </file>
 
-<file path=ppt/slideLayouts/slideLayout5.xml><?xml version="1.0" encoding="utf-8"?>
+<file path=ppt/slideLayouts/slideLayout4.xml><?xml version="1.0" encoding="utf-8"?>
 <p:sldLayout xmlns:a="http://schemas.openxmlformats.org/drawingml/2006/main" xmlns:r="http://schemas.openxmlformats.org/officeDocument/2006/relationships" xmlns:p="http://schemas.openxmlformats.org/presentationml/2006/main" type="twoObj" preserve="1">
   <p:cSld name="Two Content">
     <p:spTree>
@@ -2450,7 +1788,7 @@
 </p:sldLayout>
 </file>
 
-<file path=ppt/slideLayouts/slideLayout6.xml><?xml version="1.0" encoding="utf-8"?>
+<file path=ppt/slideLayouts/slideLayout5.xml><?xml version="1.0" encoding="utf-8"?>
 <p:sldLayout xmlns:a="http://schemas.openxmlformats.org/drawingml/2006/main" xmlns:r="http://schemas.openxmlformats.org/officeDocument/2006/relationships" xmlns:p="http://schemas.openxmlformats.org/presentationml/2006/main" type="twoTxTwoObj" preserve="1">
   <p:cSld name="Comparison">
     <p:spTree>
@@ -2829,7 +2167,7 @@
 </p:sldLayout>
 </file>
 
-<file path=ppt/slideLayouts/slideLayout7.xml><?xml version="1.0" encoding="utf-8"?>
+<file path=ppt/slideLayouts/slideLayout6.xml><?xml version="1.0" encoding="utf-8"?>
 <p:sldLayout xmlns:a="http://schemas.openxmlformats.org/drawingml/2006/main" xmlns:r="http://schemas.openxmlformats.org/officeDocument/2006/relationships" xmlns:p="http://schemas.openxmlformats.org/presentationml/2006/main" type="titleOnly" preserve="1">
   <p:cSld name="Title Only">
     <p:spTree>
@@ -2947,7 +2285,7 @@
 </p:sldLayout>
 </file>
 
-<file path=ppt/slideLayouts/slideLayout8.xml><?xml version="1.0" encoding="utf-8"?>
+<file path=ppt/slideLayouts/slideLayout7.xml><?xml version="1.0" encoding="utf-8"?>
 <p:sldLayout xmlns:a="http://schemas.openxmlformats.org/drawingml/2006/main" xmlns:r="http://schemas.openxmlformats.org/officeDocument/2006/relationships" xmlns:p="http://schemas.openxmlformats.org/presentationml/2006/main" showMasterSp="0" type="blank" preserve="1">
   <p:cSld name="Blank">
     <p:spTree>
@@ -3126,7 +2464,7 @@
 </p:sldLayout>
 </file>
 
-<file path=ppt/slideLayouts/slideLayout9.xml><?xml version="1.0" encoding="utf-8"?>
+<file path=ppt/slideLayouts/slideLayout8.xml><?xml version="1.0" encoding="utf-8"?>
 <p:sldLayout xmlns:a="http://schemas.openxmlformats.org/drawingml/2006/main" xmlns:r="http://schemas.openxmlformats.org/officeDocument/2006/relationships" xmlns:p="http://schemas.openxmlformats.org/presentationml/2006/main" showMasterSp="0" type="objTx" preserve="1">
   <p:cSld name="Content with Caption">
     <p:spTree>
@@ -3484,6 +2822,367 @@
     <p:extLst>
       <p:ext uri="{BB962C8B-B14F-4D97-AF65-F5344CB8AC3E}">
         <p14:creationId xmlns:p14="http://schemas.microsoft.com/office/powerpoint/2010/main" val="151086814"/>
+      </p:ext>
+    </p:extLst>
+  </p:cSld>
+  <p:clrMapOvr>
+    <a:masterClrMapping/>
+  </p:clrMapOvr>
+</p:sldLayout>
+</file>
+
+<file path=ppt/slideLayouts/slideLayout9.xml><?xml version="1.0" encoding="utf-8"?>
+<p:sldLayout xmlns:a="http://schemas.openxmlformats.org/drawingml/2006/main" xmlns:r="http://schemas.openxmlformats.org/officeDocument/2006/relationships" xmlns:p="http://schemas.openxmlformats.org/presentationml/2006/main" showMasterSp="0" type="picTx" preserve="1">
+  <p:cSld name="Picture with Caption">
+    <p:spTree>
+      <p:nvGrpSpPr>
+        <p:cNvPr id="1" name=""/>
+        <p:cNvGrpSpPr/>
+        <p:nvPr/>
+      </p:nvGrpSpPr>
+      <p:grpSpPr>
+        <a:xfrm>
+          <a:off x="0" y="0"/>
+          <a:ext cx="0" cy="0"/>
+          <a:chOff x="0" y="0"/>
+          <a:chExt cx="0" cy="0"/>
+        </a:xfrm>
+      </p:grpSpPr>
+      <p:sp>
+        <p:nvSpPr>
+          <p:cNvPr id="8" name="Rectangle 7"/>
+          <p:cNvSpPr/>
+          <p:nvPr/>
+        </p:nvSpPr>
+        <p:spPr>
+          <a:xfrm>
+            <a:off x="0" y="4953000"/>
+            <a:ext cx="12188825" cy="1905000"/>
+          </a:xfrm>
+          <a:prstGeom prst="rect">
+            <a:avLst/>
+          </a:prstGeom>
+          <a:solidFill>
+            <a:schemeClr val="accent2"/>
+          </a:solidFill>
+          <a:ln>
+            <a:noFill/>
+          </a:ln>
+        </p:spPr>
+        <p:style>
+          <a:lnRef idx="2">
+            <a:schemeClr val="accent1">
+              <a:shade val="50000"/>
+            </a:schemeClr>
+          </a:lnRef>
+          <a:fillRef idx="1">
+            <a:schemeClr val="accent1"/>
+          </a:fillRef>
+          <a:effectRef idx="0">
+            <a:schemeClr val="accent1"/>
+          </a:effectRef>
+          <a:fontRef idx="minor">
+            <a:schemeClr val="lt1"/>
+          </a:fontRef>
+        </p:style>
+      </p:sp>
+      <p:sp>
+        <p:nvSpPr>
+          <p:cNvPr id="9" name="Rectangle 8"/>
+          <p:cNvSpPr/>
+          <p:nvPr/>
+        </p:nvSpPr>
+        <p:spPr>
+          <a:xfrm>
+            <a:off x="15" y="4915076"/>
+            <a:ext cx="12188825" cy="64008"/>
+          </a:xfrm>
+          <a:prstGeom prst="rect">
+            <a:avLst/>
+          </a:prstGeom>
+          <a:solidFill>
+            <a:schemeClr val="accent1"/>
+          </a:solidFill>
+          <a:ln>
+            <a:noFill/>
+          </a:ln>
+        </p:spPr>
+        <p:style>
+          <a:lnRef idx="2">
+            <a:schemeClr val="accent1">
+              <a:shade val="50000"/>
+            </a:schemeClr>
+          </a:lnRef>
+          <a:fillRef idx="1">
+            <a:schemeClr val="accent1"/>
+          </a:fillRef>
+          <a:effectRef idx="0">
+            <a:schemeClr val="accent1"/>
+          </a:effectRef>
+          <a:fontRef idx="minor">
+            <a:schemeClr val="lt1"/>
+          </a:fontRef>
+        </p:style>
+      </p:sp>
+      <p:sp>
+        <p:nvSpPr>
+          <p:cNvPr id="2" name="Title 1"/>
+          <p:cNvSpPr>
+            <a:spLocks noGrp="1"/>
+          </p:cNvSpPr>
+          <p:nvPr>
+            <p:ph type="title"/>
+          </p:nvPr>
+        </p:nvSpPr>
+        <p:spPr>
+          <a:xfrm>
+            <a:off x="1097280" y="5074920"/>
+            <a:ext cx="10113264" cy="822960"/>
+          </a:xfrm>
+        </p:spPr>
+        <p:txBody>
+          <a:bodyPr lIns="91440" tIns="0" rIns="91440" bIns="0" anchor="b">
+            <a:noAutofit/>
+          </a:bodyPr>
+          <a:lstStyle>
+            <a:lvl1pPr>
+              <a:defRPr sz="3600" b="0">
+                <a:solidFill>
+                  <a:srgbClr val="FFFFFF"/>
+                </a:solidFill>
+              </a:defRPr>
+            </a:lvl1pPr>
+          </a:lstStyle>
+          <a:p>
+            <a:r>
+              <a:rPr lang="en-US"/>
+              <a:t>Click to edit Master title style</a:t>
+            </a:r>
+            <a:endParaRPr lang="en-US" dirty="0"/>
+          </a:p>
+        </p:txBody>
+      </p:sp>
+      <p:sp>
+        <p:nvSpPr>
+          <p:cNvPr id="3" name="Picture Placeholder 2"/>
+          <p:cNvSpPr>
+            <a:spLocks noGrp="1" noChangeAspect="1"/>
+          </p:cNvSpPr>
+          <p:nvPr>
+            <p:ph type="pic" idx="1"/>
+          </p:nvPr>
+        </p:nvSpPr>
+        <p:spPr>
+          <a:xfrm>
+            <a:off x="15" y="0"/>
+            <a:ext cx="12191985" cy="4915076"/>
+          </a:xfrm>
+          <a:blipFill>
+            <a:blip r:embed="rId2"/>
+            <a:stretch>
+              <a:fillRect/>
+            </a:stretch>
+          </a:blipFill>
+        </p:spPr>
+        <p:txBody>
+          <a:bodyPr lIns="457200" tIns="457200" anchor="t"/>
+          <a:lstStyle>
+            <a:lvl1pPr marL="0" indent="0">
+              <a:buNone/>
+              <a:defRPr sz="3200">
+                <a:solidFill>
+                  <a:schemeClr val="bg1"/>
+                </a:solidFill>
+              </a:defRPr>
+            </a:lvl1pPr>
+            <a:lvl2pPr marL="457200" indent="0">
+              <a:buNone/>
+              <a:defRPr sz="2800"/>
+            </a:lvl2pPr>
+            <a:lvl3pPr marL="914400" indent="0">
+              <a:buNone/>
+              <a:defRPr sz="2400"/>
+            </a:lvl3pPr>
+            <a:lvl4pPr marL="1371600" indent="0">
+              <a:buNone/>
+              <a:defRPr sz="2000"/>
+            </a:lvl4pPr>
+            <a:lvl5pPr marL="1828800" indent="0">
+              <a:buNone/>
+              <a:defRPr sz="2000"/>
+            </a:lvl5pPr>
+            <a:lvl6pPr marL="2286000" indent="0">
+              <a:buNone/>
+              <a:defRPr sz="2000"/>
+            </a:lvl6pPr>
+            <a:lvl7pPr marL="2743200" indent="0">
+              <a:buNone/>
+              <a:defRPr sz="2000"/>
+            </a:lvl7pPr>
+            <a:lvl8pPr marL="3200400" indent="0">
+              <a:buNone/>
+              <a:defRPr sz="2000"/>
+            </a:lvl8pPr>
+            <a:lvl9pPr marL="3657600" indent="0">
+              <a:buNone/>
+              <a:defRPr sz="2000"/>
+            </a:lvl9pPr>
+          </a:lstStyle>
+          <a:p>
+            <a:r>
+              <a:rPr lang="en-US"/>
+              <a:t>Click icon to add picture</a:t>
+            </a:r>
+            <a:endParaRPr lang="en-US" dirty="0"/>
+          </a:p>
+        </p:txBody>
+      </p:sp>
+      <p:sp>
+        <p:nvSpPr>
+          <p:cNvPr id="4" name="Text Placeholder 3"/>
+          <p:cNvSpPr>
+            <a:spLocks noGrp="1"/>
+          </p:cNvSpPr>
+          <p:nvPr>
+            <p:ph type="body" sz="half" idx="2"/>
+          </p:nvPr>
+        </p:nvSpPr>
+        <p:spPr>
+          <a:xfrm>
+            <a:off x="1097280" y="5907023"/>
+            <a:ext cx="10113264" cy="594360"/>
+          </a:xfrm>
+        </p:spPr>
+        <p:txBody>
+          <a:bodyPr lIns="91440" tIns="0" rIns="91440" bIns="0">
+            <a:normAutofit/>
+          </a:bodyPr>
+          <a:lstStyle>
+            <a:lvl1pPr marL="0" indent="0">
+              <a:spcBef>
+                <a:spcPts val="0"/>
+              </a:spcBef>
+              <a:spcAft>
+                <a:spcPts val="600"/>
+              </a:spcAft>
+              <a:buNone/>
+              <a:defRPr sz="1500">
+                <a:solidFill>
+                  <a:srgbClr val="FFFFFF"/>
+                </a:solidFill>
+              </a:defRPr>
+            </a:lvl1pPr>
+            <a:lvl2pPr marL="457200" indent="0">
+              <a:buNone/>
+              <a:defRPr sz="1200"/>
+            </a:lvl2pPr>
+            <a:lvl3pPr marL="914400" indent="0">
+              <a:buNone/>
+              <a:defRPr sz="1000"/>
+            </a:lvl3pPr>
+            <a:lvl4pPr marL="1371600" indent="0">
+              <a:buNone/>
+              <a:defRPr sz="900"/>
+            </a:lvl4pPr>
+            <a:lvl5pPr marL="1828800" indent="0">
+              <a:buNone/>
+              <a:defRPr sz="900"/>
+            </a:lvl5pPr>
+            <a:lvl6pPr marL="2286000" indent="0">
+              <a:buNone/>
+              <a:defRPr sz="900"/>
+            </a:lvl6pPr>
+            <a:lvl7pPr marL="2743200" indent="0">
+              <a:buNone/>
+              <a:defRPr sz="900"/>
+            </a:lvl7pPr>
+            <a:lvl8pPr marL="3200400" indent="0">
+              <a:buNone/>
+              <a:defRPr sz="900"/>
+            </a:lvl8pPr>
+            <a:lvl9pPr marL="3657600" indent="0">
+              <a:buNone/>
+              <a:defRPr sz="900"/>
+            </a:lvl9pPr>
+          </a:lstStyle>
+          <a:p>
+            <a:pPr lvl="0"/>
+            <a:r>
+              <a:rPr lang="en-US"/>
+              <a:t>Click to edit Master text styles</a:t>
+            </a:r>
+          </a:p>
+        </p:txBody>
+      </p:sp>
+      <p:sp>
+        <p:nvSpPr>
+          <p:cNvPr id="5" name="Date Placeholder 4"/>
+          <p:cNvSpPr>
+            <a:spLocks noGrp="1"/>
+          </p:cNvSpPr>
+          <p:nvPr>
+            <p:ph type="dt" sz="half" idx="10"/>
+          </p:nvPr>
+        </p:nvSpPr>
+        <p:spPr/>
+        <p:txBody>
+          <a:bodyPr/>
+          <a:lstStyle/>
+          <a:p>
+            <a:fld id="{2C5A4276-9034-4F68-8B2D-8D580C8476C4}" type="datetimeFigureOut">
+              <a:rPr lang="en-US" smtClean="0"/>
+              <a:t>10/16/2025</a:t>
+            </a:fld>
+            <a:endParaRPr lang="en-US"/>
+          </a:p>
+        </p:txBody>
+      </p:sp>
+      <p:sp>
+        <p:nvSpPr>
+          <p:cNvPr id="6" name="Footer Placeholder 5"/>
+          <p:cNvSpPr>
+            <a:spLocks noGrp="1"/>
+          </p:cNvSpPr>
+          <p:nvPr>
+            <p:ph type="ftr" sz="quarter" idx="11"/>
+          </p:nvPr>
+        </p:nvSpPr>
+        <p:spPr/>
+        <p:txBody>
+          <a:bodyPr/>
+          <a:lstStyle/>
+          <a:p>
+            <a:endParaRPr lang="en-US"/>
+          </a:p>
+        </p:txBody>
+      </p:sp>
+      <p:sp>
+        <p:nvSpPr>
+          <p:cNvPr id="7" name="Slide Number Placeholder 6"/>
+          <p:cNvSpPr>
+            <a:spLocks noGrp="1"/>
+          </p:cNvSpPr>
+          <p:nvPr>
+            <p:ph type="sldNum" sz="quarter" idx="12"/>
+          </p:nvPr>
+        </p:nvSpPr>
+        <p:spPr/>
+        <p:txBody>
+          <a:bodyPr/>
+          <a:lstStyle/>
+          <a:p>
+            <a:fld id="{51F9AB11-5268-4777-85B6-D98FC480BF1C}" type="slidenum">
+              <a:rPr lang="en-US" smtClean="0"/>
+              <a:t>‹#›</a:t>
+            </a:fld>
+            <a:endParaRPr lang="en-US"/>
+          </a:p>
+        </p:txBody>
+      </p:sp>
+    </p:spTree>
+    <p:extLst>
+      <p:ext uri="{BB962C8B-B14F-4D97-AF65-F5344CB8AC3E}">
+        <p14:creationId xmlns:p14="http://schemas.microsoft.com/office/powerpoint/2010/main" val="1651376254"/>
       </p:ext>
     </p:extLst>
   </p:cSld>
@@ -3860,17 +3559,16 @@
   <p:clrMap bg1="lt1" tx1="dk1" bg2="lt2" tx2="dk2" accent1="accent1" accent2="accent2" accent3="accent3" accent4="accent4" accent5="accent5" accent6="accent6" hlink="hlink" folHlink="folHlink"/>
   <p:sldLayoutIdLst>
     <p:sldLayoutId id="2147483662" r:id="rId1"/>
-    <p:sldLayoutId id="2147483672" r:id="rId2"/>
-    <p:sldLayoutId id="2147483661" r:id="rId3"/>
-    <p:sldLayoutId id="2147483663" r:id="rId4"/>
-    <p:sldLayoutId id="2147483664" r:id="rId5"/>
-    <p:sldLayoutId id="2147483665" r:id="rId6"/>
-    <p:sldLayoutId id="2147483666" r:id="rId7"/>
-    <p:sldLayoutId id="2147483667" r:id="rId8"/>
-    <p:sldLayoutId id="2147483668" r:id="rId9"/>
-    <p:sldLayoutId id="2147483669" r:id="rId10"/>
-    <p:sldLayoutId id="2147483670" r:id="rId11"/>
-    <p:sldLayoutId id="2147483671" r:id="rId12"/>
+    <p:sldLayoutId id="2147483661" r:id="rId2"/>
+    <p:sldLayoutId id="2147483663" r:id="rId3"/>
+    <p:sldLayoutId id="2147483664" r:id="rId4"/>
+    <p:sldLayoutId id="2147483665" r:id="rId5"/>
+    <p:sldLayoutId id="2147483666" r:id="rId6"/>
+    <p:sldLayoutId id="2147483667" r:id="rId7"/>
+    <p:sldLayoutId id="2147483668" r:id="rId8"/>
+    <p:sldLayoutId id="2147483669" r:id="rId9"/>
+    <p:sldLayoutId id="2147483670" r:id="rId10"/>
+    <p:sldLayoutId id="2147483671" r:id="rId11"/>
   </p:sldLayoutIdLst>
   <p:txStyles>
     <p:titleStyle>

</xml_diff>